<commit_message>
One bug about time stamp
</commit_message>
<xml_diff>
--- a/SChat – A Secure Chat.pptx
+++ b/SChat – A Secure Chat.pptx
@@ -2,7 +2,7 @@
 <file path=ppt/presentation.xml><?xml version="1.0" encoding="utf-8"?>
 <p:presentation xmlns:a="http://schemas.openxmlformats.org/drawingml/2006/main" xmlns:r="http://schemas.openxmlformats.org/officeDocument/2006/relationships" xmlns:p="http://schemas.openxmlformats.org/presentationml/2006/main" autoCompressPictures="0">
   <p:sldMasterIdLst>
-    <p:sldMasterId id="2147483648" r:id="rId1"/>
+    <p:sldMasterId id="2147483837" r:id="rId1"/>
   </p:sldMasterIdLst>
   <p:sldIdLst>
     <p:sldId id="256" r:id="rId2"/>
@@ -131,6 +131,10 @@
     </p:ext>
   </p:extLst>
 </p:presentation>
+</file>
+
+<file path=ppt/revisionInfo.xml><?xml version="1.0" encoding="utf-8"?>
+<p1510:revInfo xmlns:a="http://schemas.openxmlformats.org/drawingml/2006/main" xmlns:r="http://schemas.openxmlformats.org/officeDocument/2006/relationships" xmlns:p1510="http://schemas.microsoft.com/office/powerpoint/2015/10/main"/>
 </file>
 
 <file path=ppt/slideLayouts/slideLayout1.xml><?xml version="1.0" encoding="utf-8"?>
@@ -711,7 +715,7 @@
           </a:lstStyle>
           <a:p>
             <a:r>
-              <a:rPr lang="en-US" smtClean="0"/>
+              <a:rPr lang="en-US"/>
               <a:t>Click to edit Master title style</a:t>
             </a:r>
             <a:endParaRPr lang="en-US" dirty="0"/>
@@ -831,7 +835,7 @@
           </a:lstStyle>
           <a:p>
             <a:r>
-              <a:rPr lang="en-US" smtClean="0"/>
+              <a:rPr lang="en-US"/>
               <a:t>Click to edit Master subtitle style</a:t>
             </a:r>
             <a:endParaRPr lang="en-US" dirty="0"/>
@@ -854,9 +858,9 @@
           <a:lstStyle/>
           <a:p>
             <a:fld id="{B61BEF0D-F0BB-DE4B-95CE-6DB70DBA9567}" type="datetimeFigureOut">
-              <a:rPr lang="en-US" dirty="0"/>
+              <a:rPr lang="en-US" smtClean="0"/>
               <a:pPr/>
-              <a:t>6/28/2017</a:t>
+              <a:t>28/6/2017</a:t>
             </a:fld>
             <a:endParaRPr lang="en-US" dirty="0"/>
           </a:p>
@@ -897,7 +901,7 @@
           <a:lstStyle/>
           <a:p>
             <a:fld id="{D57F1E4F-1CFF-5643-939E-217C01CDF565}" type="slidenum">
-              <a:rPr lang="en-US" dirty="0"/>
+              <a:rPr lang="en-US" smtClean="0"/>
               <a:pPr/>
               <a:t>‹#›</a:t>
             </a:fld>
@@ -906,6 +910,11 @@
         </p:txBody>
       </p:sp>
     </p:spTree>
+    <p:extLst>
+      <p:ext uri="{BB962C8B-B14F-4D97-AF65-F5344CB8AC3E}">
+        <p14:creationId xmlns:p14="http://schemas.microsoft.com/office/powerpoint/2010/main" val="932095391"/>
+      </p:ext>
+    </p:extLst>
   </p:cSld>
   <p:clrMapOvr>
     <a:masterClrMapping/>
@@ -957,7 +966,7 @@
           </a:lstStyle>
           <a:p>
             <a:r>
-              <a:rPr lang="en-US" smtClean="0"/>
+              <a:rPr lang="en-US"/>
               <a:t>Click to edit Master title style</a:t>
             </a:r>
             <a:endParaRPr lang="en-US" dirty="0"/>
@@ -1080,7 +1089,7 @@
           <a:p>
             <a:pPr lvl="0"/>
             <a:r>
-              <a:rPr lang="en-US" smtClean="0"/>
+              <a:rPr lang="en-US"/>
               <a:t>Edit Master text styles</a:t>
             </a:r>
           </a:p>
@@ -1102,9 +1111,9 @@
           <a:lstStyle/>
           <a:p>
             <a:fld id="{B61BEF0D-F0BB-DE4B-95CE-6DB70DBA9567}" type="datetimeFigureOut">
-              <a:rPr lang="en-US" dirty="0"/>
+              <a:rPr lang="en-US" smtClean="0"/>
               <a:pPr/>
-              <a:t>6/28/2017</a:t>
+              <a:t>28/6/2017</a:t>
             </a:fld>
             <a:endParaRPr lang="en-US" dirty="0"/>
           </a:p>
@@ -1145,7 +1154,7 @@
           <a:lstStyle/>
           <a:p>
             <a:fld id="{D57F1E4F-1CFF-5643-939E-217C01CDF565}" type="slidenum">
-              <a:rPr lang="en-US" dirty="0"/>
+              <a:rPr lang="en-US" smtClean="0"/>
               <a:pPr/>
               <a:t>‹#›</a:t>
             </a:fld>
@@ -1154,6 +1163,11 @@
         </p:txBody>
       </p:sp>
     </p:spTree>
+    <p:extLst>
+      <p:ext uri="{BB962C8B-B14F-4D97-AF65-F5344CB8AC3E}">
+        <p14:creationId xmlns:p14="http://schemas.microsoft.com/office/powerpoint/2010/main" val="768285118"/>
+      </p:ext>
+    </p:extLst>
   </p:cSld>
   <p:clrMapOvr>
     <a:masterClrMapping/>
@@ -1205,7 +1219,7 @@
           </a:lstStyle>
           <a:p>
             <a:r>
-              <a:rPr lang="en-US" smtClean="0"/>
+              <a:rPr lang="en-US"/>
               <a:t>Click to edit Master title style</a:t>
             </a:r>
             <a:endParaRPr lang="en-US" dirty="0"/>
@@ -1269,7 +1283,7 @@
           <a:p>
             <a:pPr lvl="0"/>
             <a:r>
-              <a:rPr lang="en-US" smtClean="0"/>
+              <a:rPr lang="en-US"/>
               <a:t>Edit Master text styles</a:t>
             </a:r>
           </a:p>
@@ -1391,7 +1405,7 @@
           <a:p>
             <a:pPr lvl="0"/>
             <a:r>
-              <a:rPr lang="en-US" smtClean="0"/>
+              <a:rPr lang="en-US"/>
               <a:t>Edit Master text styles</a:t>
             </a:r>
           </a:p>
@@ -1413,9 +1427,9 @@
           <a:lstStyle/>
           <a:p>
             <a:fld id="{B61BEF0D-F0BB-DE4B-95CE-6DB70DBA9567}" type="datetimeFigureOut">
-              <a:rPr lang="en-US" dirty="0"/>
+              <a:rPr lang="en-US" smtClean="0"/>
               <a:pPr/>
-              <a:t>6/28/2017</a:t>
+              <a:t>28/6/2017</a:t>
             </a:fld>
             <a:endParaRPr lang="en-US" dirty="0"/>
           </a:p>
@@ -1456,7 +1470,7 @@
           <a:lstStyle/>
           <a:p>
             <a:fld id="{D57F1E4F-1CFF-5643-939E-217C01CDF565}" type="slidenum">
-              <a:rPr lang="en-US" dirty="0"/>
+              <a:rPr lang="en-US" smtClean="0"/>
               <a:pPr/>
               <a:t>‹#›</a:t>
             </a:fld>
@@ -1555,6 +1569,11 @@
         </p:txBody>
       </p:sp>
     </p:spTree>
+    <p:extLst>
+      <p:ext uri="{BB962C8B-B14F-4D97-AF65-F5344CB8AC3E}">
+        <p14:creationId xmlns:p14="http://schemas.microsoft.com/office/powerpoint/2010/main" val="1739868840"/>
+      </p:ext>
+    </p:extLst>
   </p:cSld>
   <p:clrMapOvr>
     <a:masterClrMapping/>
@@ -1606,7 +1625,7 @@
           </a:lstStyle>
           <a:p>
             <a:r>
-              <a:rPr lang="en-US" smtClean="0"/>
+              <a:rPr lang="en-US"/>
               <a:t>Click to edit Master title style</a:t>
             </a:r>
             <a:endParaRPr lang="en-US" dirty="0"/>
@@ -1729,7 +1748,7 @@
           <a:p>
             <a:pPr lvl="0"/>
             <a:r>
-              <a:rPr lang="en-US" smtClean="0"/>
+              <a:rPr lang="en-US"/>
               <a:t>Edit Master text styles</a:t>
             </a:r>
           </a:p>
@@ -1751,9 +1770,9 @@
           <a:lstStyle/>
           <a:p>
             <a:fld id="{B61BEF0D-F0BB-DE4B-95CE-6DB70DBA9567}" type="datetimeFigureOut">
-              <a:rPr lang="en-US" dirty="0"/>
+              <a:rPr lang="en-US" smtClean="0"/>
               <a:pPr/>
-              <a:t>6/28/2017</a:t>
+              <a:t>28/6/2017</a:t>
             </a:fld>
             <a:endParaRPr lang="en-US" dirty="0"/>
           </a:p>
@@ -1794,7 +1813,7 @@
           <a:lstStyle/>
           <a:p>
             <a:fld id="{D57F1E4F-1CFF-5643-939E-217C01CDF565}" type="slidenum">
-              <a:rPr lang="en-US" dirty="0"/>
+              <a:rPr lang="en-US" smtClean="0"/>
               <a:pPr/>
               <a:t>‹#›</a:t>
             </a:fld>
@@ -1803,6 +1822,11 @@
         </p:txBody>
       </p:sp>
     </p:spTree>
+    <p:extLst>
+      <p:ext uri="{BB962C8B-B14F-4D97-AF65-F5344CB8AC3E}">
+        <p14:creationId xmlns:p14="http://schemas.microsoft.com/office/powerpoint/2010/main" val="1018446196"/>
+      </p:ext>
+    </p:extLst>
   </p:cSld>
   <p:clrMapOvr>
     <a:masterClrMapping/>
@@ -1854,7 +1878,7 @@
           </a:lstStyle>
           <a:p>
             <a:r>
-              <a:rPr lang="en-US" smtClean="0"/>
+              <a:rPr lang="en-US"/>
               <a:t>Click to edit Master title style</a:t>
             </a:r>
             <a:endParaRPr lang="en-US" dirty="0"/>
@@ -1918,7 +1942,7 @@
           <a:p>
             <a:pPr lvl="0"/>
             <a:r>
-              <a:rPr lang="en-US" smtClean="0"/>
+              <a:rPr lang="en-US"/>
               <a:t>Edit Master text styles</a:t>
             </a:r>
           </a:p>
@@ -2040,7 +2064,7 @@
           <a:p>
             <a:pPr lvl="0"/>
             <a:r>
-              <a:rPr lang="en-US" smtClean="0"/>
+              <a:rPr lang="en-US"/>
               <a:t>Edit Master text styles</a:t>
             </a:r>
           </a:p>
@@ -2062,9 +2086,9 @@
           <a:lstStyle/>
           <a:p>
             <a:fld id="{B61BEF0D-F0BB-DE4B-95CE-6DB70DBA9567}" type="datetimeFigureOut">
-              <a:rPr lang="en-US" dirty="0"/>
+              <a:rPr lang="en-US" smtClean="0"/>
               <a:pPr/>
-              <a:t>6/28/2017</a:t>
+              <a:t>28/6/2017</a:t>
             </a:fld>
             <a:endParaRPr lang="en-US" dirty="0"/>
           </a:p>
@@ -2105,7 +2129,7 @@
           <a:lstStyle/>
           <a:p>
             <a:fld id="{D57F1E4F-1CFF-5643-939E-217C01CDF565}" type="slidenum">
-              <a:rPr lang="en-US" dirty="0"/>
+              <a:rPr lang="en-US" smtClean="0"/>
               <a:pPr/>
               <a:t>‹#›</a:t>
             </a:fld>
@@ -2196,6 +2220,11 @@
         </p:txBody>
       </p:sp>
     </p:spTree>
+    <p:extLst>
+      <p:ext uri="{BB962C8B-B14F-4D97-AF65-F5344CB8AC3E}">
+        <p14:creationId xmlns:p14="http://schemas.microsoft.com/office/powerpoint/2010/main" val="4249579068"/>
+      </p:ext>
+    </p:extLst>
   </p:cSld>
   <p:clrMapOvr>
     <a:masterClrMapping/>
@@ -2247,7 +2276,7 @@
           </a:lstStyle>
           <a:p>
             <a:r>
-              <a:rPr lang="en-US" smtClean="0"/>
+              <a:rPr lang="en-US"/>
               <a:t>Click to edit Master title style</a:t>
             </a:r>
             <a:endParaRPr lang="en-US" dirty="0"/>
@@ -2308,7 +2337,7 @@
           <a:p>
             <a:pPr lvl="0"/>
             <a:r>
-              <a:rPr lang="en-US" smtClean="0"/>
+              <a:rPr lang="en-US"/>
               <a:t>Edit Master text styles</a:t>
             </a:r>
           </a:p>
@@ -2430,7 +2459,7 @@
           <a:p>
             <a:pPr lvl="0"/>
             <a:r>
-              <a:rPr lang="en-US" smtClean="0"/>
+              <a:rPr lang="en-US"/>
               <a:t>Edit Master text styles</a:t>
             </a:r>
           </a:p>
@@ -2452,9 +2481,9 @@
           <a:lstStyle/>
           <a:p>
             <a:fld id="{B61BEF0D-F0BB-DE4B-95CE-6DB70DBA9567}" type="datetimeFigureOut">
-              <a:rPr lang="en-US" dirty="0"/>
+              <a:rPr lang="en-US" smtClean="0"/>
               <a:pPr/>
-              <a:t>6/28/2017</a:t>
+              <a:t>28/6/2017</a:t>
             </a:fld>
             <a:endParaRPr lang="en-US" dirty="0"/>
           </a:p>
@@ -2495,7 +2524,7 @@
           <a:lstStyle/>
           <a:p>
             <a:fld id="{D57F1E4F-1CFF-5643-939E-217C01CDF565}" type="slidenum">
-              <a:rPr lang="en-US" dirty="0"/>
+              <a:rPr lang="en-US" smtClean="0"/>
               <a:pPr/>
               <a:t>‹#›</a:t>
             </a:fld>
@@ -2504,6 +2533,11 @@
         </p:txBody>
       </p:sp>
     </p:spTree>
+    <p:extLst>
+      <p:ext uri="{BB962C8B-B14F-4D97-AF65-F5344CB8AC3E}">
+        <p14:creationId xmlns:p14="http://schemas.microsoft.com/office/powerpoint/2010/main" val="1290184708"/>
+      </p:ext>
+    </p:extLst>
   </p:cSld>
   <p:clrMapOvr>
     <a:masterClrMapping/>
@@ -2544,7 +2578,7 @@
           <a:lstStyle/>
           <a:p>
             <a:r>
-              <a:rPr lang="en-US" smtClean="0"/>
+              <a:rPr lang="en-US"/>
               <a:t>Click to edit Master title style</a:t>
             </a:r>
             <a:endParaRPr lang="en-US" dirty="0"/>
@@ -2568,35 +2602,35 @@
           <a:p>
             <a:pPr lvl="0"/>
             <a:r>
-              <a:rPr lang="en-US" smtClean="0"/>
+              <a:rPr lang="en-US"/>
               <a:t>Edit Master text styles</a:t>
             </a:r>
           </a:p>
           <a:p>
             <a:pPr lvl="1"/>
             <a:r>
-              <a:rPr lang="en-US" smtClean="0"/>
+              <a:rPr lang="en-US"/>
               <a:t>Second level</a:t>
             </a:r>
           </a:p>
           <a:p>
             <a:pPr lvl="2"/>
             <a:r>
-              <a:rPr lang="en-US" smtClean="0"/>
+              <a:rPr lang="en-US"/>
               <a:t>Third level</a:t>
             </a:r>
           </a:p>
           <a:p>
             <a:pPr lvl="3"/>
             <a:r>
-              <a:rPr lang="en-US" smtClean="0"/>
+              <a:rPr lang="en-US"/>
               <a:t>Fourth level</a:t>
             </a:r>
           </a:p>
           <a:p>
             <a:pPr lvl="4"/>
             <a:r>
-              <a:rPr lang="en-US" smtClean="0"/>
+              <a:rPr lang="en-US"/>
               <a:t>Fifth level</a:t>
             </a:r>
             <a:endParaRPr lang="en-US" dirty="0"/>
@@ -2619,8 +2653,8 @@
           <a:lstStyle/>
           <a:p>
             <a:fld id="{55C6B4A9-1611-4792-9094-5F34BCA07E0B}" type="datetimeFigureOut">
-              <a:rPr lang="en-US" dirty="0"/>
-              <a:t>6/28/2017</a:t>
+              <a:rPr lang="en-US" smtClean="0"/>
+              <a:t>28/6/2017</a:t>
             </a:fld>
             <a:endParaRPr lang="en-US" dirty="0"/>
           </a:p>
@@ -2661,7 +2695,7 @@
           <a:lstStyle/>
           <a:p>
             <a:fld id="{89333C77-0158-454C-844F-B7AB9BD7DAD4}" type="slidenum">
-              <a:rPr lang="en-US" dirty="0"/>
+              <a:rPr lang="en-US" smtClean="0"/>
               <a:t>‹#›</a:t>
             </a:fld>
             <a:endParaRPr lang="en-US" dirty="0"/>
@@ -2669,6 +2703,11 @@
         </p:txBody>
       </p:sp>
     </p:spTree>
+    <p:extLst>
+      <p:ext uri="{BB962C8B-B14F-4D97-AF65-F5344CB8AC3E}">
+        <p14:creationId xmlns:p14="http://schemas.microsoft.com/office/powerpoint/2010/main" val="589379457"/>
+      </p:ext>
+    </p:extLst>
   </p:cSld>
   <p:clrMapOvr>
     <a:masterClrMapping/>
@@ -2714,7 +2753,7 @@
           <a:lstStyle/>
           <a:p>
             <a:r>
-              <a:rPr lang="en-US" smtClean="0"/>
+              <a:rPr lang="en-US"/>
               <a:t>Click to edit Master title style</a:t>
             </a:r>
             <a:endParaRPr lang="en-US" dirty="0"/>
@@ -2743,35 +2782,35 @@
           <a:p>
             <a:pPr lvl="0"/>
             <a:r>
-              <a:rPr lang="en-US" smtClean="0"/>
+              <a:rPr lang="en-US"/>
               <a:t>Edit Master text styles</a:t>
             </a:r>
           </a:p>
           <a:p>
             <a:pPr lvl="1"/>
             <a:r>
-              <a:rPr lang="en-US" smtClean="0"/>
+              <a:rPr lang="en-US"/>
               <a:t>Second level</a:t>
             </a:r>
           </a:p>
           <a:p>
             <a:pPr lvl="2"/>
             <a:r>
-              <a:rPr lang="en-US" smtClean="0"/>
+              <a:rPr lang="en-US"/>
               <a:t>Third level</a:t>
             </a:r>
           </a:p>
           <a:p>
             <a:pPr lvl="3"/>
             <a:r>
-              <a:rPr lang="en-US" smtClean="0"/>
+              <a:rPr lang="en-US"/>
               <a:t>Fourth level</a:t>
             </a:r>
           </a:p>
           <a:p>
             <a:pPr lvl="4"/>
             <a:r>
-              <a:rPr lang="en-US" smtClean="0"/>
+              <a:rPr lang="en-US"/>
               <a:t>Fifth level</a:t>
             </a:r>
             <a:endParaRPr lang="en-US" dirty="0"/>
@@ -2794,9 +2833,9 @@
           <a:lstStyle/>
           <a:p>
             <a:fld id="{B61BEF0D-F0BB-DE4B-95CE-6DB70DBA9567}" type="datetimeFigureOut">
-              <a:rPr lang="en-US" dirty="0"/>
+              <a:rPr lang="en-US" smtClean="0"/>
               <a:pPr/>
-              <a:t>6/28/2017</a:t>
+              <a:t>28/6/2017</a:t>
             </a:fld>
             <a:endParaRPr lang="en-US" dirty="0"/>
           </a:p>
@@ -2837,7 +2876,7 @@
           <a:lstStyle/>
           <a:p>
             <a:fld id="{D57F1E4F-1CFF-5643-939E-217C01CDF565}" type="slidenum">
-              <a:rPr lang="en-US" dirty="0"/>
+              <a:rPr lang="en-US" smtClean="0"/>
               <a:pPr/>
               <a:t>‹#›</a:t>
             </a:fld>
@@ -2846,6 +2885,11 @@
         </p:txBody>
       </p:sp>
     </p:spTree>
+    <p:extLst>
+      <p:ext uri="{BB962C8B-B14F-4D97-AF65-F5344CB8AC3E}">
+        <p14:creationId xmlns:p14="http://schemas.microsoft.com/office/powerpoint/2010/main" val="2848980290"/>
+      </p:ext>
+    </p:extLst>
   </p:cSld>
   <p:clrMapOvr>
     <a:masterClrMapping/>
@@ -2892,7 +2936,7 @@
           </a:lstStyle>
           <a:p>
             <a:r>
-              <a:rPr lang="en-US" smtClean="0"/>
+              <a:rPr lang="en-US"/>
               <a:t>Click to edit Master title style</a:t>
             </a:r>
             <a:endParaRPr lang="en-US" dirty="0"/>
@@ -2916,35 +2960,35 @@
           <a:p>
             <a:pPr lvl="0"/>
             <a:r>
-              <a:rPr lang="en-US" smtClean="0"/>
+              <a:rPr lang="en-US"/>
               <a:t>Edit Master text styles</a:t>
             </a:r>
           </a:p>
           <a:p>
             <a:pPr lvl="1"/>
             <a:r>
-              <a:rPr lang="en-US" smtClean="0"/>
+              <a:rPr lang="en-US"/>
               <a:t>Second level</a:t>
             </a:r>
           </a:p>
           <a:p>
             <a:pPr lvl="2"/>
             <a:r>
-              <a:rPr lang="en-US" smtClean="0"/>
+              <a:rPr lang="en-US"/>
               <a:t>Third level</a:t>
             </a:r>
           </a:p>
           <a:p>
             <a:pPr lvl="3"/>
             <a:r>
-              <a:rPr lang="en-US" smtClean="0"/>
+              <a:rPr lang="en-US"/>
               <a:t>Fourth level</a:t>
             </a:r>
           </a:p>
           <a:p>
             <a:pPr lvl="4"/>
             <a:r>
-              <a:rPr lang="en-US" smtClean="0"/>
+              <a:rPr lang="en-US"/>
               <a:t>Fifth level</a:t>
             </a:r>
             <a:endParaRPr lang="en-US" dirty="0"/>
@@ -2967,9 +3011,9 @@
           <a:lstStyle/>
           <a:p>
             <a:fld id="{B61BEF0D-F0BB-DE4B-95CE-6DB70DBA9567}" type="datetimeFigureOut">
-              <a:rPr lang="en-US" dirty="0"/>
+              <a:rPr lang="en-US" smtClean="0"/>
               <a:pPr/>
-              <a:t>6/28/2017</a:t>
+              <a:t>28/6/2017</a:t>
             </a:fld>
             <a:endParaRPr lang="en-US" dirty="0"/>
           </a:p>
@@ -3010,7 +3054,7 @@
           <a:lstStyle/>
           <a:p>
             <a:fld id="{D57F1E4F-1CFF-5643-939E-217C01CDF565}" type="slidenum">
-              <a:rPr lang="en-US" dirty="0"/>
+              <a:rPr lang="en-US" smtClean="0"/>
               <a:pPr/>
               <a:t>‹#›</a:t>
             </a:fld>
@@ -3019,6 +3063,11 @@
         </p:txBody>
       </p:sp>
     </p:spTree>
+    <p:extLst>
+      <p:ext uri="{BB962C8B-B14F-4D97-AF65-F5344CB8AC3E}">
+        <p14:creationId xmlns:p14="http://schemas.microsoft.com/office/powerpoint/2010/main" val="466696804"/>
+      </p:ext>
+    </p:extLst>
   </p:cSld>
   <p:clrMapOvr>
     <a:masterClrMapping/>
@@ -3068,7 +3117,7 @@
           </a:lstStyle>
           <a:p>
             <a:r>
-              <a:rPr lang="en-US" smtClean="0"/>
+              <a:rPr lang="en-US"/>
               <a:t>Click to edit Master title style</a:t>
             </a:r>
             <a:endParaRPr lang="en-US" dirty="0"/>
@@ -3189,7 +3238,7 @@
           <a:p>
             <a:pPr lvl="0"/>
             <a:r>
-              <a:rPr lang="en-US" smtClean="0"/>
+              <a:rPr lang="en-US"/>
               <a:t>Edit Master text styles</a:t>
             </a:r>
           </a:p>
@@ -3211,9 +3260,9 @@
           <a:lstStyle/>
           <a:p>
             <a:fld id="{B61BEF0D-F0BB-DE4B-95CE-6DB70DBA9567}" type="datetimeFigureOut">
-              <a:rPr lang="en-US" dirty="0"/>
+              <a:rPr lang="en-US" smtClean="0"/>
               <a:pPr/>
-              <a:t>6/28/2017</a:t>
+              <a:t>28/6/2017</a:t>
             </a:fld>
             <a:endParaRPr lang="en-US" dirty="0"/>
           </a:p>
@@ -3254,7 +3303,7 @@
           <a:lstStyle/>
           <a:p>
             <a:fld id="{D57F1E4F-1CFF-5643-939E-217C01CDF565}" type="slidenum">
-              <a:rPr lang="en-US" dirty="0"/>
+              <a:rPr lang="en-US" smtClean="0"/>
               <a:pPr/>
               <a:t>‹#›</a:t>
             </a:fld>
@@ -3263,6 +3312,11 @@
         </p:txBody>
       </p:sp>
     </p:spTree>
+    <p:extLst>
+      <p:ext uri="{BB962C8B-B14F-4D97-AF65-F5344CB8AC3E}">
+        <p14:creationId xmlns:p14="http://schemas.microsoft.com/office/powerpoint/2010/main" val="1154311975"/>
+      </p:ext>
+    </p:extLst>
   </p:cSld>
   <p:clrMapOvr>
     <a:masterClrMapping/>
@@ -3303,7 +3357,7 @@
           <a:lstStyle/>
           <a:p>
             <a:r>
-              <a:rPr lang="en-US" smtClean="0"/>
+              <a:rPr lang="en-US"/>
               <a:t>Click to edit Master title style</a:t>
             </a:r>
             <a:endParaRPr lang="en-US" dirty="0"/>
@@ -3332,35 +3386,35 @@
           <a:p>
             <a:pPr lvl="0"/>
             <a:r>
-              <a:rPr lang="en-US" smtClean="0"/>
+              <a:rPr lang="en-US"/>
               <a:t>Edit Master text styles</a:t>
             </a:r>
           </a:p>
           <a:p>
             <a:pPr lvl="1"/>
             <a:r>
-              <a:rPr lang="en-US" smtClean="0"/>
+              <a:rPr lang="en-US"/>
               <a:t>Second level</a:t>
             </a:r>
           </a:p>
           <a:p>
             <a:pPr lvl="2"/>
             <a:r>
-              <a:rPr lang="en-US" smtClean="0"/>
+              <a:rPr lang="en-US"/>
               <a:t>Third level</a:t>
             </a:r>
           </a:p>
           <a:p>
             <a:pPr lvl="3"/>
             <a:r>
-              <a:rPr lang="en-US" smtClean="0"/>
+              <a:rPr lang="en-US"/>
               <a:t>Fourth level</a:t>
             </a:r>
           </a:p>
           <a:p>
             <a:pPr lvl="4"/>
             <a:r>
-              <a:rPr lang="en-US" smtClean="0"/>
+              <a:rPr lang="en-US"/>
               <a:t>Fifth level</a:t>
             </a:r>
             <a:endParaRPr lang="en-US" dirty="0"/>
@@ -3389,35 +3443,35 @@
           <a:p>
             <a:pPr lvl="0"/>
             <a:r>
-              <a:rPr lang="en-US" smtClean="0"/>
+              <a:rPr lang="en-US"/>
               <a:t>Edit Master text styles</a:t>
             </a:r>
           </a:p>
           <a:p>
             <a:pPr lvl="1"/>
             <a:r>
-              <a:rPr lang="en-US" smtClean="0"/>
+              <a:rPr lang="en-US"/>
               <a:t>Second level</a:t>
             </a:r>
           </a:p>
           <a:p>
             <a:pPr lvl="2"/>
             <a:r>
-              <a:rPr lang="en-US" smtClean="0"/>
+              <a:rPr lang="en-US"/>
               <a:t>Third level</a:t>
             </a:r>
           </a:p>
           <a:p>
             <a:pPr lvl="3"/>
             <a:r>
-              <a:rPr lang="en-US" smtClean="0"/>
+              <a:rPr lang="en-US"/>
               <a:t>Fourth level</a:t>
             </a:r>
           </a:p>
           <a:p>
             <a:pPr lvl="4"/>
             <a:r>
-              <a:rPr lang="en-US" smtClean="0"/>
+              <a:rPr lang="en-US"/>
               <a:t>Fifth level</a:t>
             </a:r>
             <a:endParaRPr lang="en-US" dirty="0"/>
@@ -3440,8 +3494,8 @@
           <a:lstStyle/>
           <a:p>
             <a:fld id="{EB712588-04B1-427B-82EE-E8DB90309F08}" type="datetimeFigureOut">
-              <a:rPr lang="en-US" dirty="0"/>
-              <a:t>6/28/2017</a:t>
+              <a:rPr lang="en-US" smtClean="0"/>
+              <a:t>28/6/2017</a:t>
             </a:fld>
             <a:endParaRPr lang="en-US" dirty="0"/>
           </a:p>
@@ -3482,7 +3536,7 @@
           <a:lstStyle/>
           <a:p>
             <a:fld id="{6FF9F0C5-380F-41C2-899A-BAC0F0927E16}" type="slidenum">
-              <a:rPr lang="en-US" dirty="0"/>
+              <a:rPr lang="en-US" smtClean="0"/>
               <a:t>‹#›</a:t>
             </a:fld>
             <a:endParaRPr lang="en-US" dirty="0"/>
@@ -3490,10 +3544,20 @@
         </p:txBody>
       </p:sp>
     </p:spTree>
+    <p:extLst>
+      <p:ext uri="{BB962C8B-B14F-4D97-AF65-F5344CB8AC3E}">
+        <p14:creationId xmlns:p14="http://schemas.microsoft.com/office/powerpoint/2010/main" val="2860207510"/>
+      </p:ext>
+    </p:extLst>
   </p:cSld>
   <p:clrMapOvr>
     <a:masterClrMapping/>
   </p:clrMapOvr>
+  <p:extLst>
+    <p:ext uri="{DCECCB84-F9BA-43D5-87BE-67443E8EF086}">
+      <p15:sldGuideLst xmlns:p15="http://schemas.microsoft.com/office/powerpoint/2012/main"/>
+    </p:ext>
+  </p:extLst>
 </p:sldLayout>
 </file>
 
@@ -3534,7 +3598,7 @@
           </a:lstStyle>
           <a:p>
             <a:r>
-              <a:rPr lang="en-US" smtClean="0"/>
+              <a:rPr lang="en-US"/>
               <a:t>Click to edit Master title style</a:t>
             </a:r>
             <a:endParaRPr lang="en-US" dirty="0"/>
@@ -3602,7 +3666,7 @@
           <a:p>
             <a:pPr lvl="0"/>
             <a:r>
-              <a:rPr lang="en-US" smtClean="0"/>
+              <a:rPr lang="en-US"/>
               <a:t>Edit Master text styles</a:t>
             </a:r>
           </a:p>
@@ -3632,35 +3696,35 @@
           <a:p>
             <a:pPr lvl="0"/>
             <a:r>
-              <a:rPr lang="en-US" smtClean="0"/>
+              <a:rPr lang="en-US"/>
               <a:t>Edit Master text styles</a:t>
             </a:r>
           </a:p>
           <a:p>
             <a:pPr lvl="1"/>
             <a:r>
-              <a:rPr lang="en-US" smtClean="0"/>
+              <a:rPr lang="en-US"/>
               <a:t>Second level</a:t>
             </a:r>
           </a:p>
           <a:p>
             <a:pPr lvl="2"/>
             <a:r>
-              <a:rPr lang="en-US" smtClean="0"/>
+              <a:rPr lang="en-US"/>
               <a:t>Third level</a:t>
             </a:r>
           </a:p>
           <a:p>
             <a:pPr lvl="3"/>
             <a:r>
-              <a:rPr lang="en-US" smtClean="0"/>
+              <a:rPr lang="en-US"/>
               <a:t>Fourth level</a:t>
             </a:r>
           </a:p>
           <a:p>
             <a:pPr lvl="4"/>
             <a:r>
-              <a:rPr lang="en-US" smtClean="0"/>
+              <a:rPr lang="en-US"/>
               <a:t>Fifth level</a:t>
             </a:r>
             <a:endParaRPr lang="en-US" dirty="0"/>
@@ -3728,7 +3792,7 @@
           <a:p>
             <a:pPr lvl="0"/>
             <a:r>
-              <a:rPr lang="en-US" smtClean="0"/>
+              <a:rPr lang="en-US"/>
               <a:t>Edit Master text styles</a:t>
             </a:r>
           </a:p>
@@ -3758,35 +3822,35 @@
           <a:p>
             <a:pPr lvl="0"/>
             <a:r>
-              <a:rPr lang="en-US" smtClean="0"/>
+              <a:rPr lang="en-US"/>
               <a:t>Edit Master text styles</a:t>
             </a:r>
           </a:p>
           <a:p>
             <a:pPr lvl="1"/>
             <a:r>
-              <a:rPr lang="en-US" smtClean="0"/>
+              <a:rPr lang="en-US"/>
               <a:t>Second level</a:t>
             </a:r>
           </a:p>
           <a:p>
             <a:pPr lvl="2"/>
             <a:r>
-              <a:rPr lang="en-US" smtClean="0"/>
+              <a:rPr lang="en-US"/>
               <a:t>Third level</a:t>
             </a:r>
           </a:p>
           <a:p>
             <a:pPr lvl="3"/>
             <a:r>
-              <a:rPr lang="en-US" smtClean="0"/>
+              <a:rPr lang="en-US"/>
               <a:t>Fourth level</a:t>
             </a:r>
           </a:p>
           <a:p>
             <a:pPr lvl="4"/>
             <a:r>
-              <a:rPr lang="en-US" smtClean="0"/>
+              <a:rPr lang="en-US"/>
               <a:t>Fifth level</a:t>
             </a:r>
             <a:endParaRPr lang="en-US" dirty="0"/>
@@ -3809,9 +3873,9 @@
           <a:lstStyle/>
           <a:p>
             <a:fld id="{B61BEF0D-F0BB-DE4B-95CE-6DB70DBA9567}" type="datetimeFigureOut">
-              <a:rPr lang="en-US" dirty="0"/>
+              <a:rPr lang="en-US" smtClean="0"/>
               <a:pPr/>
-              <a:t>6/28/2017</a:t>
+              <a:t>28/6/2017</a:t>
             </a:fld>
             <a:endParaRPr lang="en-US" dirty="0"/>
           </a:p>
@@ -3852,7 +3916,7 @@
           <a:lstStyle/>
           <a:p>
             <a:fld id="{D57F1E4F-1CFF-5643-939E-217C01CDF565}" type="slidenum">
-              <a:rPr lang="en-US" dirty="0"/>
+              <a:rPr lang="en-US" smtClean="0"/>
               <a:pPr/>
               <a:t>‹#›</a:t>
             </a:fld>
@@ -3861,10 +3925,20 @@
         </p:txBody>
       </p:sp>
     </p:spTree>
+    <p:extLst>
+      <p:ext uri="{BB962C8B-B14F-4D97-AF65-F5344CB8AC3E}">
+        <p14:creationId xmlns:p14="http://schemas.microsoft.com/office/powerpoint/2010/main" val="3248691312"/>
+      </p:ext>
+    </p:extLst>
   </p:cSld>
   <p:clrMapOvr>
     <a:masterClrMapping/>
   </p:clrMapOvr>
+  <p:extLst>
+    <p:ext uri="{DCECCB84-F9BA-43D5-87BE-67443E8EF086}">
+      <p15:sldGuideLst xmlns:p15="http://schemas.microsoft.com/office/powerpoint/2012/main"/>
+    </p:ext>
+  </p:extLst>
 </p:sldLayout>
 </file>
 
@@ -3906,7 +3980,7 @@
           <a:lstStyle/>
           <a:p>
             <a:r>
-              <a:rPr lang="en-US" smtClean="0"/>
+              <a:rPr lang="en-US"/>
               <a:t>Click to edit Master title style</a:t>
             </a:r>
             <a:endParaRPr lang="en-US" dirty="0"/>
@@ -3929,9 +4003,9 @@
           <a:lstStyle/>
           <a:p>
             <a:fld id="{B61BEF0D-F0BB-DE4B-95CE-6DB70DBA9567}" type="datetimeFigureOut">
-              <a:rPr lang="en-US" dirty="0"/>
+              <a:rPr lang="en-US" smtClean="0"/>
               <a:pPr/>
-              <a:t>6/28/2017</a:t>
+              <a:t>28/6/2017</a:t>
             </a:fld>
             <a:endParaRPr lang="en-US" dirty="0"/>
           </a:p>
@@ -3972,7 +4046,7 @@
           <a:lstStyle/>
           <a:p>
             <a:fld id="{D57F1E4F-1CFF-5643-939E-217C01CDF565}" type="slidenum">
-              <a:rPr lang="en-US" dirty="0"/>
+              <a:rPr lang="en-US" smtClean="0"/>
               <a:pPr/>
               <a:t>‹#›</a:t>
             </a:fld>
@@ -3981,6 +4055,11 @@
         </p:txBody>
       </p:sp>
     </p:spTree>
+    <p:extLst>
+      <p:ext uri="{BB962C8B-B14F-4D97-AF65-F5344CB8AC3E}">
+        <p14:creationId xmlns:p14="http://schemas.microsoft.com/office/powerpoint/2010/main" val="809940484"/>
+      </p:ext>
+    </p:extLst>
   </p:cSld>
   <p:clrMapOvr>
     <a:masterClrMapping/>
@@ -4021,9 +4100,9 @@
           <a:lstStyle/>
           <a:p>
             <a:fld id="{B61BEF0D-F0BB-DE4B-95CE-6DB70DBA9567}" type="datetimeFigureOut">
-              <a:rPr lang="en-US" dirty="0"/>
+              <a:rPr lang="en-US" smtClean="0"/>
               <a:pPr/>
-              <a:t>6/28/2017</a:t>
+              <a:t>28/6/2017</a:t>
             </a:fld>
             <a:endParaRPr lang="en-US" dirty="0"/>
           </a:p>
@@ -4064,7 +4143,7 @@
           <a:lstStyle/>
           <a:p>
             <a:fld id="{D57F1E4F-1CFF-5643-939E-217C01CDF565}" type="slidenum">
-              <a:rPr lang="en-US" dirty="0"/>
+              <a:rPr lang="en-US" smtClean="0"/>
               <a:pPr/>
               <a:t>‹#›</a:t>
             </a:fld>
@@ -4073,6 +4152,11 @@
         </p:txBody>
       </p:sp>
     </p:spTree>
+    <p:extLst>
+      <p:ext uri="{BB962C8B-B14F-4D97-AF65-F5344CB8AC3E}">
+        <p14:creationId xmlns:p14="http://schemas.microsoft.com/office/powerpoint/2010/main" val="1782179107"/>
+      </p:ext>
+    </p:extLst>
   </p:cSld>
   <p:clrMapOvr>
     <a:masterClrMapping/>
@@ -4124,7 +4208,7 @@
           </a:lstStyle>
           <a:p>
             <a:r>
-              <a:rPr lang="en-US" smtClean="0"/>
+              <a:rPr lang="en-US"/>
               <a:t>Click to edit Master title style</a:t>
             </a:r>
             <a:endParaRPr lang="en-US" dirty="0"/>
@@ -4155,35 +4239,35 @@
           <a:p>
             <a:pPr lvl="0"/>
             <a:r>
-              <a:rPr lang="en-US" smtClean="0"/>
+              <a:rPr lang="en-US"/>
               <a:t>Edit Master text styles</a:t>
             </a:r>
           </a:p>
           <a:p>
             <a:pPr lvl="1"/>
             <a:r>
-              <a:rPr lang="en-US" smtClean="0"/>
+              <a:rPr lang="en-US"/>
               <a:t>Second level</a:t>
             </a:r>
           </a:p>
           <a:p>
             <a:pPr lvl="2"/>
             <a:r>
-              <a:rPr lang="en-US" smtClean="0"/>
+              <a:rPr lang="en-US"/>
               <a:t>Third level</a:t>
             </a:r>
           </a:p>
           <a:p>
             <a:pPr lvl="3"/>
             <a:r>
-              <a:rPr lang="en-US" smtClean="0"/>
+              <a:rPr lang="en-US"/>
               <a:t>Fourth level</a:t>
             </a:r>
           </a:p>
           <a:p>
             <a:pPr lvl="4"/>
             <a:r>
-              <a:rPr lang="en-US" smtClean="0"/>
+              <a:rPr lang="en-US"/>
               <a:t>Fifth level</a:t>
             </a:r>
             <a:endParaRPr lang="en-US" dirty="0"/>
@@ -4251,7 +4335,7 @@
           <a:p>
             <a:pPr lvl="0"/>
             <a:r>
-              <a:rPr lang="en-US" smtClean="0"/>
+              <a:rPr lang="en-US"/>
               <a:t>Edit Master text styles</a:t>
             </a:r>
           </a:p>
@@ -4273,8 +4357,8 @@
           <a:lstStyle/>
           <a:p>
             <a:fld id="{42A54C80-263E-416B-A8E0-580EDEADCBDC}" type="datetimeFigureOut">
-              <a:rPr lang="en-US" dirty="0"/>
-              <a:t>6/28/2017</a:t>
+              <a:rPr lang="en-US" smtClean="0"/>
+              <a:t>28/6/2017</a:t>
             </a:fld>
             <a:endParaRPr lang="en-US" dirty="0"/>
           </a:p>
@@ -4315,7 +4399,7 @@
           <a:lstStyle/>
           <a:p>
             <a:fld id="{519954A3-9DFD-4C44-94BA-B95130A3BA1C}" type="slidenum">
-              <a:rPr lang="en-US" dirty="0"/>
+              <a:rPr lang="en-US" smtClean="0"/>
               <a:t>‹#›</a:t>
             </a:fld>
             <a:endParaRPr lang="en-US" dirty="0"/>
@@ -4323,10 +4407,20 @@
         </p:txBody>
       </p:sp>
     </p:spTree>
+    <p:extLst>
+      <p:ext uri="{BB962C8B-B14F-4D97-AF65-F5344CB8AC3E}">
+        <p14:creationId xmlns:p14="http://schemas.microsoft.com/office/powerpoint/2010/main" val="1321386418"/>
+      </p:ext>
+    </p:extLst>
   </p:cSld>
   <p:clrMapOvr>
     <a:masterClrMapping/>
   </p:clrMapOvr>
+  <p:extLst>
+    <p:ext uri="{DCECCB84-F9BA-43D5-87BE-67443E8EF086}">
+      <p15:sldGuideLst xmlns:p15="http://schemas.microsoft.com/office/powerpoint/2012/main"/>
+    </p:ext>
+  </p:extLst>
 </p:sldLayout>
 </file>
 
@@ -4374,7 +4468,7 @@
           </a:lstStyle>
           <a:p>
             <a:r>
-              <a:rPr lang="en-US" smtClean="0"/>
+              <a:rPr lang="en-US"/>
               <a:t>Click to edit Master title style</a:t>
             </a:r>
             <a:endParaRPr lang="en-US" dirty="0"/>
@@ -4441,7 +4535,7 @@
           </a:lstStyle>
           <a:p>
             <a:r>
-              <a:rPr lang="en-US" smtClean="0"/>
+              <a:rPr lang="en-US"/>
               <a:t>Click icon to add picture</a:t>
             </a:r>
             <a:endParaRPr lang="en-US" dirty="0"/>
@@ -4509,7 +4603,7 @@
           <a:p>
             <a:pPr lvl="0"/>
             <a:r>
-              <a:rPr lang="en-US" smtClean="0"/>
+              <a:rPr lang="en-US"/>
               <a:t>Edit Master text styles</a:t>
             </a:r>
           </a:p>
@@ -4531,9 +4625,9 @@
           <a:lstStyle/>
           <a:p>
             <a:fld id="{B61BEF0D-F0BB-DE4B-95CE-6DB70DBA9567}" type="datetimeFigureOut">
-              <a:rPr lang="en-US" dirty="0"/>
+              <a:rPr lang="en-US" smtClean="0"/>
               <a:pPr/>
-              <a:t>6/28/2017</a:t>
+              <a:t>28/6/2017</a:t>
             </a:fld>
             <a:endParaRPr lang="en-US" dirty="0"/>
           </a:p>
@@ -4574,7 +4668,7 @@
           <a:lstStyle/>
           <a:p>
             <a:fld id="{D57F1E4F-1CFF-5643-939E-217C01CDF565}" type="slidenum">
-              <a:rPr lang="en-US" dirty="0"/>
+              <a:rPr lang="en-US" smtClean="0"/>
               <a:pPr/>
               <a:t>‹#›</a:t>
             </a:fld>
@@ -4583,6 +4677,11 @@
         </p:txBody>
       </p:sp>
     </p:spTree>
+    <p:extLst>
+      <p:ext uri="{BB962C8B-B14F-4D97-AF65-F5344CB8AC3E}">
+        <p14:creationId xmlns:p14="http://schemas.microsoft.com/office/powerpoint/2010/main" val="2717473418"/>
+      </p:ext>
+    </p:extLst>
   </p:cSld>
   <p:clrMapOvr>
     <a:masterClrMapping/>
@@ -5168,7 +5267,7 @@
           <a:lstStyle/>
           <a:p>
             <a:r>
-              <a:rPr lang="en-US" smtClean="0"/>
+              <a:rPr lang="en-US"/>
               <a:t>Click to edit Master title style</a:t>
             </a:r>
             <a:endParaRPr lang="en-US" dirty="0"/>
@@ -5202,35 +5301,35 @@
           <a:p>
             <a:pPr lvl="0"/>
             <a:r>
-              <a:rPr lang="en-US" smtClean="0"/>
+              <a:rPr lang="en-US"/>
               <a:t>Edit Master text styles</a:t>
             </a:r>
           </a:p>
           <a:p>
             <a:pPr lvl="1"/>
             <a:r>
-              <a:rPr lang="en-US" smtClean="0"/>
+              <a:rPr lang="en-US"/>
               <a:t>Second level</a:t>
             </a:r>
           </a:p>
           <a:p>
             <a:pPr lvl="2"/>
             <a:r>
-              <a:rPr lang="en-US" smtClean="0"/>
+              <a:rPr lang="en-US"/>
               <a:t>Third level</a:t>
             </a:r>
           </a:p>
           <a:p>
             <a:pPr lvl="3"/>
             <a:r>
-              <a:rPr lang="en-US" smtClean="0"/>
+              <a:rPr lang="en-US"/>
               <a:t>Fourth level</a:t>
             </a:r>
           </a:p>
           <a:p>
             <a:pPr lvl="4"/>
             <a:r>
-              <a:rPr lang="en-US" smtClean="0"/>
+              <a:rPr lang="en-US"/>
               <a:t>Fifth level</a:t>
             </a:r>
             <a:endParaRPr lang="en-US" dirty="0"/>
@@ -5271,9 +5370,9 @@
           </a:lstStyle>
           <a:p>
             <a:fld id="{B61BEF0D-F0BB-DE4B-95CE-6DB70DBA9567}" type="datetimeFigureOut">
-              <a:rPr lang="en-US" dirty="0"/>
+              <a:rPr lang="en-US" smtClean="0"/>
               <a:pPr/>
-              <a:t>6/28/2017</a:t>
+              <a:t>28/6/2017</a:t>
             </a:fld>
             <a:endParaRPr lang="en-US" dirty="0"/>
           </a:p>
@@ -5348,7 +5447,7 @@
           </a:lstStyle>
           <a:p>
             <a:fld id="{D57F1E4F-1CFF-5643-939E-217C01CDF565}" type="slidenum">
-              <a:rPr lang="en-US" dirty="0"/>
+              <a:rPr lang="en-US" smtClean="0"/>
               <a:pPr/>
               <a:t>‹#›</a:t>
             </a:fld>
@@ -5357,25 +5456,30 @@
         </p:txBody>
       </p:sp>
     </p:spTree>
+    <p:extLst>
+      <p:ext uri="{BB962C8B-B14F-4D97-AF65-F5344CB8AC3E}">
+        <p14:creationId xmlns:p14="http://schemas.microsoft.com/office/powerpoint/2010/main" val="3066764771"/>
+      </p:ext>
+    </p:extLst>
   </p:cSld>
   <p:clrMap bg1="lt1" tx1="dk1" bg2="lt2" tx2="dk2" accent1="accent1" accent2="accent2" accent3="accent3" accent4="accent4" accent5="accent5" accent6="accent6" hlink="hlink" folHlink="folHlink"/>
   <p:sldLayoutIdLst>
-    <p:sldLayoutId id="2147483649" r:id="rId1"/>
-    <p:sldLayoutId id="2147483650" r:id="rId2"/>
-    <p:sldLayoutId id="2147483651" r:id="rId3"/>
-    <p:sldLayoutId id="2147483665" r:id="rId4"/>
-    <p:sldLayoutId id="2147483653" r:id="rId5"/>
-    <p:sldLayoutId id="2147483654" r:id="rId6"/>
-    <p:sldLayoutId id="2147483655" r:id="rId7"/>
-    <p:sldLayoutId id="2147483666" r:id="rId8"/>
-    <p:sldLayoutId id="2147483657" r:id="rId9"/>
-    <p:sldLayoutId id="2147483660" r:id="rId10"/>
-    <p:sldLayoutId id="2147483661" r:id="rId11"/>
-    <p:sldLayoutId id="2147483662" r:id="rId12"/>
-    <p:sldLayoutId id="2147483663" r:id="rId13"/>
-    <p:sldLayoutId id="2147483664" r:id="rId14"/>
-    <p:sldLayoutId id="2147483667" r:id="rId15"/>
-    <p:sldLayoutId id="2147483659" r:id="rId16"/>
+    <p:sldLayoutId id="2147483838" r:id="rId1"/>
+    <p:sldLayoutId id="2147483839" r:id="rId2"/>
+    <p:sldLayoutId id="2147483840" r:id="rId3"/>
+    <p:sldLayoutId id="2147483841" r:id="rId4"/>
+    <p:sldLayoutId id="2147483842" r:id="rId5"/>
+    <p:sldLayoutId id="2147483843" r:id="rId6"/>
+    <p:sldLayoutId id="2147483844" r:id="rId7"/>
+    <p:sldLayoutId id="2147483845" r:id="rId8"/>
+    <p:sldLayoutId id="2147483846" r:id="rId9"/>
+    <p:sldLayoutId id="2147483847" r:id="rId10"/>
+    <p:sldLayoutId id="2147483848" r:id="rId11"/>
+    <p:sldLayoutId id="2147483849" r:id="rId12"/>
+    <p:sldLayoutId id="2147483850" r:id="rId13"/>
+    <p:sldLayoutId id="2147483851" r:id="rId14"/>
+    <p:sldLayoutId id="2147483852" r:id="rId15"/>
+    <p:sldLayoutId id="2147483853" r:id="rId16"/>
   </p:sldLayoutIdLst>
   <p:txStyles>
     <p:titleStyle>
@@ -5773,6 +5877,11 @@
       </a:lvl9pPr>
     </p:otherStyle>
   </p:txStyles>
+  <p:extLst>
+    <p:ext uri="{27BBF7A9-308A-43DC-89C8-2F10F3537804}">
+      <p15:sldGuideLst xmlns:p15="http://schemas.microsoft.com/office/powerpoint/2012/main"/>
+    </p:ext>
+  </p:extLst>
 </p:sldMaster>
 </file>
 
@@ -5814,14 +5923,13 @@
           <a:lstStyle/>
           <a:p>
             <a:r>
-              <a:rPr lang="en-US" dirty="0" err="1" smtClean="0"/>
+              <a:rPr lang="en-US" dirty="0" err="1"/>
               <a:t>SChat</a:t>
             </a:r>
             <a:r>
-              <a:rPr lang="en-US" dirty="0" smtClean="0"/>
+              <a:rPr lang="en-US" dirty="0"/>
               <a:t> – A Secure Chat </a:t>
             </a:r>
-            <a:endParaRPr lang="en-US" dirty="0"/>
           </a:p>
         </p:txBody>
       </p:sp>
@@ -5844,54 +5952,30 @@
           <a:p>
             <a:pPr algn="l"/>
             <a:r>
-              <a:rPr lang="en-US" dirty="0" smtClean="0"/>
-              <a:t>By Ezra Block and Shy </a:t>
-            </a:r>
-            <a:r>
-              <a:rPr lang="en-US" dirty="0" err="1" smtClean="0"/>
-              <a:t>Tennenbaum</a:t>
-            </a:r>
-            <a:r>
               <a:rPr lang="en-US" dirty="0"/>
-              <a:t/>
+              <a:t>By Ezra Block and Shy Tennenbaum</a:t>
             </a:r>
             <a:br>
               <a:rPr lang="en-US" dirty="0"/>
             </a:br>
             <a:r>
-              <a:rPr lang="en-US" dirty="0" smtClean="0"/>
-              <a:t>Directed by Dr. Ariel </a:t>
-            </a:r>
-            <a:r>
-              <a:rPr lang="en-US" dirty="0" err="1" smtClean="0"/>
-              <a:t>Stulman</a:t>
-            </a:r>
-            <a:r>
-              <a:rPr lang="en-US" dirty="0" smtClean="0"/>
-              <a:t> and </a:t>
-            </a:r>
-            <a:r>
-              <a:rPr lang="en-US" dirty="0" err="1" smtClean="0"/>
-              <a:t>Aharon</a:t>
-            </a:r>
-            <a:r>
-              <a:rPr lang="en-US" dirty="0" smtClean="0"/>
-              <a:t> </a:t>
-            </a:r>
-            <a:r>
-              <a:rPr lang="en-US" dirty="0" err="1" smtClean="0"/>
+              <a:rPr lang="en-US" dirty="0"/>
+              <a:t>Directed by Dr. Ariel Stulman </a:t>
+            </a:r>
+            <a:r>
+              <a:rPr lang="en-US"/>
+              <a:t>and Aaron </a:t>
+            </a:r>
+            <a:r>
+              <a:rPr lang="en-US" dirty="0"/>
               <a:t>Slutsky</a:t>
             </a:r>
-            <a:r>
-              <a:rPr lang="en-US" dirty="0" smtClean="0"/>
-              <a:t/>
-            </a:r>
             <a:br>
-              <a:rPr lang="en-US" dirty="0" smtClean="0"/>
+              <a:rPr lang="en-US" dirty="0"/>
             </a:br>
             <a:r>
-              <a:rPr lang="en-US" dirty="0" smtClean="0"/>
-              <a:t>Semester B – 2017 </a:t>
+              <a:rPr lang="en-US" dirty="0"/>
+              <a:t>Semester B – 2017 – Fundamentals For Network Security</a:t>
             </a:r>
           </a:p>
         </p:txBody>
@@ -5943,11 +6027,7 @@
           <a:p>
             <a:r>
               <a:rPr lang="en-US" dirty="0"/>
-              <a:t>Get Info </a:t>
-            </a:r>
-            <a:r>
-              <a:rPr lang="en-US" dirty="0"/>
-              <a:t>Process:</a:t>
+              <a:t>Get Info Process:</a:t>
             </a:r>
           </a:p>
         </p:txBody>
@@ -5974,7 +6054,7 @@
               <a:buChar char="ü"/>
             </a:pPr>
             <a:r>
-              <a:rPr lang="en-US" sz="2400" dirty="0" smtClean="0"/>
+              <a:rPr lang="en-US" sz="2400" dirty="0"/>
               <a:t>Authenticity</a:t>
             </a:r>
           </a:p>
@@ -5984,10 +6064,10 @@
               <a:buChar char="ü"/>
             </a:pPr>
             <a:r>
-              <a:rPr lang="en-US" sz="2400" dirty="0" smtClean="0"/>
+              <a:rPr lang="en-US" sz="2400" dirty="0"/>
               <a:t>Anonymity</a:t>
             </a:r>
-            <a:endParaRPr lang="en-US" sz="2200" dirty="0" smtClean="0"/>
+            <a:endParaRPr lang="en-US" sz="2200" dirty="0"/>
           </a:p>
         </p:txBody>
       </p:sp>
@@ -6262,24 +6342,8 @@
           <a:lstStyle/>
           <a:p>
             <a:r>
-              <a:rPr lang="en-US" dirty="0" smtClean="0"/>
-              <a:t>Open Chat Step 1: </a:t>
-            </a:r>
-            <a:r>
-              <a:rPr lang="en-US" dirty="0" smtClean="0"/>
-              <a:t>Alice with Bob </a:t>
-            </a:r>
-            <a:r>
               <a:rPr lang="en-US" dirty="0"/>
-              <a:t>– </a:t>
-            </a:r>
-            <a:r>
-              <a:rPr lang="en-US" dirty="0" smtClean="0"/>
-              <a:t>Handshake  </a:t>
-            </a:r>
-            <a:r>
-              <a:rPr lang="en-US" dirty="0"/>
-              <a:t/>
+              <a:t>Open Chat Step 1: Alice with Bob – Handshake  </a:t>
             </a:r>
             <a:br>
               <a:rPr lang="en-US" dirty="0"/>
@@ -6346,10 +6410,9 @@
           <a:lstStyle/>
           <a:p>
             <a:r>
-              <a:rPr lang="en-US" dirty="0" smtClean="0"/>
+              <a:rPr lang="en-US" dirty="0"/>
               <a:t>Alice</a:t>
             </a:r>
-            <a:endParaRPr lang="en-US" dirty="0"/>
           </a:p>
         </p:txBody>
       </p:sp>
@@ -6411,10 +6474,9 @@
           <a:lstStyle/>
           <a:p>
             <a:r>
-              <a:rPr lang="en-US" dirty="0" smtClean="0"/>
+              <a:rPr lang="en-US" dirty="0"/>
               <a:t>Bob</a:t>
             </a:r>
-            <a:endParaRPr lang="en-US" dirty="0"/>
           </a:p>
         </p:txBody>
       </p:sp>
@@ -6477,18 +6539,13 @@
           <a:lstStyle/>
           <a:p>
             <a:r>
-              <a:rPr lang="en-US" dirty="0" smtClean="0">
+              <a:rPr lang="en-US" dirty="0">
                 <a:solidFill>
                   <a:srgbClr val="C00000"/>
                 </a:solidFill>
               </a:rPr>
               <a:t>token</a:t>
             </a:r>
-            <a:endParaRPr lang="en-US" dirty="0">
-              <a:solidFill>
-                <a:srgbClr val="C00000"/>
-              </a:solidFill>
-            </a:endParaRPr>
           </a:p>
         </p:txBody>
       </p:sp>
@@ -6551,7 +6608,7 @@
           <a:lstStyle/>
           <a:p>
             <a:r>
-              <a:rPr lang="en-US" dirty="0" smtClean="0">
+              <a:rPr lang="en-US" dirty="0">
                 <a:solidFill>
                   <a:srgbClr val="FFC000"/>
                 </a:solidFill>
@@ -6559,7 +6616,7 @@
               <a:t>Encrypted with shared-key </a:t>
             </a:r>
             <a:r>
-              <a:rPr lang="en-US" dirty="0" err="1" smtClean="0">
+              <a:rPr lang="en-US" dirty="0" err="1">
                 <a:solidFill>
                   <a:srgbClr val="FFC000"/>
                 </a:solidFill>
@@ -6597,10 +6654,9 @@
           <a:lstStyle/>
           <a:p>
             <a:r>
-              <a:rPr lang="en-US" dirty="0" smtClean="0"/>
+              <a:rPr lang="en-US" dirty="0"/>
               <a:t>Hi:</a:t>
             </a:r>
-            <a:endParaRPr lang="en-US" dirty="0"/>
           </a:p>
         </p:txBody>
       </p:sp>
@@ -6627,10 +6683,9 @@
           <a:lstStyle/>
           <a:p>
             <a:r>
-              <a:rPr lang="en-US" dirty="0" smtClean="0"/>
+              <a:rPr lang="en-US" dirty="0"/>
               <a:t>OK:</a:t>
             </a:r>
-            <a:endParaRPr lang="en-US" dirty="0"/>
           </a:p>
         </p:txBody>
       </p:sp>
@@ -6693,18 +6748,17 @@
           <a:lstStyle/>
           <a:p>
             <a:r>
-              <a:rPr lang="en-US" dirty="0" smtClean="0"/>
+              <a:rPr lang="en-US" dirty="0"/>
               <a:t>Great (</a:t>
             </a:r>
             <a:r>
-              <a:rPr lang="en-US" dirty="0" err="1" smtClean="0"/>
+              <a:rPr lang="en-US" dirty="0" err="1"/>
               <a:t>Gitarot</a:t>
             </a:r>
             <a:r>
-              <a:rPr lang="en-US" dirty="0" smtClean="0"/>
+              <a:rPr lang="en-US" dirty="0"/>
               <a:t>):</a:t>
             </a:r>
-            <a:endParaRPr lang="en-US" dirty="0"/>
           </a:p>
         </p:txBody>
       </p:sp>
@@ -6731,18 +6785,9 @@
           <a:lstStyle/>
           <a:p>
             <a:r>
-              <a:rPr lang="en-US" dirty="0" smtClean="0"/>
-              <a:t>Encrypted with </a:t>
-            </a:r>
-            <a:r>
-              <a:rPr lang="en-US" dirty="0" smtClean="0"/>
-              <a:t>DH shared key</a:t>
-            </a:r>
-            <a:r>
-              <a:rPr lang="en-US" dirty="0" smtClean="0"/>
-              <a:t> using AES</a:t>
-            </a:r>
-            <a:endParaRPr lang="en-US" dirty="0"/>
+              <a:rPr lang="en-US" dirty="0"/>
+              <a:t>Encrypted with DH shared key using AES</a:t>
+            </a:r>
           </a:p>
         </p:txBody>
       </p:sp>
@@ -6793,7 +6838,7 @@
           <a:p>
             <a:pPr algn="ctr"/>
             <a:r>
-              <a:rPr lang="en-US" dirty="0" smtClean="0">
+              <a:rPr lang="en-US" dirty="0">
                 <a:solidFill>
                   <a:schemeClr val="tx1"/>
                 </a:solidFill>
@@ -6801,7 +6846,7 @@
               <a:t>“Alice”, Shared-key </a:t>
             </a:r>
             <a:r>
-              <a:rPr lang="en-US" dirty="0" err="1" smtClean="0">
+              <a:rPr lang="en-US" dirty="0" err="1">
                 <a:solidFill>
                   <a:schemeClr val="tx1"/>
                 </a:solidFill>
@@ -6864,21 +6909,13 @@
                   <a:schemeClr val="tx1"/>
                 </a:solidFill>
               </a:rPr>
-              <a:t>Public key DH </a:t>
-            </a:r>
-            <a:r>
-              <a:rPr lang="en-US" dirty="0" smtClean="0">
-                <a:solidFill>
-                  <a:schemeClr val="tx1"/>
-                </a:solidFill>
-              </a:rPr>
-              <a:t>–Alice,</a:t>
+              <a:t>Public key DH –Alice,</a:t>
             </a:r>
           </a:p>
           <a:p>
             <a:pPr algn="ctr"/>
             <a:r>
-              <a:rPr lang="en-US" dirty="0" err="1" smtClean="0">
+              <a:rPr lang="en-US" dirty="0" err="1">
                 <a:solidFill>
                   <a:schemeClr val="tx1"/>
                 </a:solidFill>
@@ -6886,18 +6923,13 @@
               <a:t>Nounce</a:t>
             </a:r>
             <a:r>
-              <a:rPr lang="en-US" dirty="0" smtClean="0">
+              <a:rPr lang="en-US" dirty="0">
                 <a:solidFill>
                   <a:schemeClr val="tx1"/>
                 </a:solidFill>
               </a:rPr>
               <a:t> n2</a:t>
             </a:r>
-            <a:endParaRPr lang="en-US" dirty="0">
-              <a:solidFill>
-                <a:schemeClr val="tx1"/>
-              </a:solidFill>
-            </a:endParaRPr>
           </a:p>
         </p:txBody>
       </p:sp>
@@ -6961,37 +6993,8 @@
                   <a:schemeClr val="tx1"/>
                 </a:solidFill>
               </a:rPr>
-              <a:t> </a:t>
-            </a:r>
-            <a:r>
-              <a:rPr lang="en-US" dirty="0" smtClean="0">
-                <a:solidFill>
-                  <a:schemeClr val="tx1"/>
-                </a:solidFill>
-              </a:rPr>
-              <a:t>n2, </a:t>
-            </a:r>
-            <a:r>
-              <a:rPr lang="en-US" dirty="0">
-                <a:solidFill>
-                  <a:schemeClr val="tx1"/>
-                </a:solidFill>
-              </a:rPr>
-              <a:t>Public key DH –Bob</a:t>
-            </a:r>
-            <a:r>
-              <a:rPr lang="en-US" dirty="0" smtClean="0">
-                <a:solidFill>
-                  <a:schemeClr val="tx1"/>
-                </a:solidFill>
-              </a:rPr>
-              <a:t>,</a:t>
-            </a:r>
-            <a:endParaRPr lang="en-US" dirty="0">
-              <a:solidFill>
-                <a:schemeClr val="tx1"/>
-              </a:solidFill>
-            </a:endParaRPr>
+              <a:t> n2, Public key DH –Bob,</a:t>
+            </a:r>
           </a:p>
         </p:txBody>
       </p:sp>
@@ -7055,23 +7058,7 @@
                   <a:schemeClr val="tx1"/>
                 </a:solidFill>
               </a:rPr>
-              <a:t> </a:t>
-            </a:r>
-            <a:r>
-              <a:rPr lang="en-US" dirty="0" smtClean="0">
-                <a:solidFill>
-                  <a:schemeClr val="tx1"/>
-                </a:solidFill>
-              </a:rPr>
-              <a:t>n2 </a:t>
-            </a:r>
-            <a:r>
-              <a:rPr lang="en-US" dirty="0">
-                <a:solidFill>
-                  <a:schemeClr val="tx1"/>
-                </a:solidFill>
-              </a:rPr>
-              <a:t>+ 1</a:t>
+              <a:t> n2 + 1</a:t>
             </a:r>
           </a:p>
         </p:txBody>
@@ -8396,12 +8383,8 @@
           <a:lstStyle/>
           <a:p>
             <a:r>
-              <a:rPr lang="en-US" dirty="0" smtClean="0"/>
-              <a:t>Establishing Secure Chat Process</a:t>
-            </a:r>
-            <a:r>
               <a:rPr lang="en-US" dirty="0"/>
-              <a:t>:</a:t>
+              <a:t>Establishing Secure Chat Process:</a:t>
             </a:r>
           </a:p>
         </p:txBody>
@@ -8441,7 +8424,6 @@
               <a:rPr lang="en-US" sz="2400" dirty="0"/>
               <a:t>Confidentiality </a:t>
             </a:r>
-            <a:endParaRPr lang="en-US" sz="2400" dirty="0" smtClean="0"/>
           </a:p>
           <a:p>
             <a:pPr>
@@ -8828,10 +8810,9 @@
           <a:p>
             <a:pPr algn="ctr"/>
             <a:r>
-              <a:rPr lang="en-US" dirty="0" smtClean="0"/>
+              <a:rPr lang="en-US" dirty="0"/>
               <a:t>Login Window:</a:t>
             </a:r>
-            <a:endParaRPr lang="en-US" dirty="0"/>
           </a:p>
         </p:txBody>
       </p:sp>
@@ -8875,13 +8856,6 @@
   <p:clrMapOvr>
     <a:masterClrMapping/>
   </p:clrMapOvr>
-  <p:timing>
-    <p:tnLst>
-      <p:par>
-        <p:cTn id="1" dur="indefinite" restart="never" nodeType="tmRoot"/>
-      </p:par>
-    </p:tnLst>
-  </p:timing>
 </p:sld>
 </file>
 
@@ -8970,13 +8944,6 @@
   <p:clrMapOvr>
     <a:masterClrMapping/>
   </p:clrMapOvr>
-  <p:timing>
-    <p:tnLst>
-      <p:par>
-        <p:cTn id="1" dur="indefinite" restart="never" nodeType="tmRoot"/>
-      </p:par>
-    </p:tnLst>
-  </p:timing>
 </p:sld>
 </file>
 
@@ -9065,13 +9032,6 @@
   <p:clrMapOvr>
     <a:masterClrMapping/>
   </p:clrMapOvr>
-  <p:timing>
-    <p:tnLst>
-      <p:par>
-        <p:cTn id="1" dur="indefinite" restart="never" nodeType="tmRoot"/>
-      </p:par>
-    </p:tnLst>
-  </p:timing>
 </p:sld>
 </file>
 
@@ -9154,7 +9114,7 @@
             <a:br>
               <a:rPr lang="en-US" sz="2000" dirty="0"/>
             </a:br>
-            <a:endParaRPr lang="en-US" sz="2000" dirty="0" smtClean="0"/>
+            <a:endParaRPr lang="en-US" sz="2000" dirty="0"/>
           </a:p>
         </p:txBody>
       </p:sp>
@@ -9168,13 +9128,6 @@
   <p:clrMapOvr>
     <a:masterClrMapping/>
   </p:clrMapOvr>
-  <p:timing>
-    <p:tnLst>
-      <p:par>
-        <p:cTn id="1" dur="indefinite" restart="never" nodeType="tmRoot"/>
-      </p:par>
-    </p:tnLst>
-  </p:timing>
 </p:sld>
 </file>
 
@@ -9249,7 +9202,6 @@
               <a:rPr lang="en-US" sz="2000" dirty="0"/>
               <a:t>A few chats can be opened simultaneously from the previous window!</a:t>
             </a:r>
-            <a:endParaRPr lang="en-US" sz="2000" dirty="0"/>
           </a:p>
         </p:txBody>
       </p:sp>
@@ -9263,13 +9215,6 @@
   <p:clrMapOvr>
     <a:masterClrMapping/>
   </p:clrMapOvr>
-  <p:timing>
-    <p:tnLst>
-      <p:par>
-        <p:cTn id="1" dur="indefinite" restart="never" nodeType="tmRoot"/>
-      </p:par>
-    </p:tnLst>
-  </p:timing>
 </p:sld>
 </file>
 
@@ -9385,10 +9330,9 @@
               <a:buNone/>
             </a:pPr>
             <a:r>
-              <a:rPr lang="en-US" sz="2000" dirty="0" smtClean="0"/>
+              <a:rPr lang="en-US" sz="2000" dirty="0"/>
               <a:t>When one side terminates the chat. The other side gets the following message:</a:t>
             </a:r>
-            <a:endParaRPr lang="en-US" sz="2000" dirty="0"/>
           </a:p>
         </p:txBody>
       </p:sp>
@@ -9402,13 +9346,6 @@
   <p:clrMapOvr>
     <a:masterClrMapping/>
   </p:clrMapOvr>
-  <p:timing>
-    <p:tnLst>
-      <p:par>
-        <p:cTn id="1" dur="indefinite" restart="never" nodeType="tmRoot"/>
-      </p:par>
-    </p:tnLst>
-  </p:timing>
 </p:sld>
 </file>
 
@@ -9429,6 +9366,33 @@
           <a:chExt cx="0" cy="0"/>
         </a:xfrm>
       </p:grpSpPr>
+      <p:sp>
+        <p:nvSpPr>
+          <p:cNvPr id="6" name="Title 1"/>
+          <p:cNvSpPr>
+            <a:spLocks noGrp="1"/>
+          </p:cNvSpPr>
+          <p:nvPr>
+            <p:ph type="title"/>
+          </p:nvPr>
+        </p:nvSpPr>
+        <p:spPr>
+          <a:xfrm>
+            <a:off x="517314" y="594360"/>
+            <a:ext cx="8596668" cy="1320800"/>
+          </a:xfrm>
+        </p:spPr>
+        <p:txBody>
+          <a:bodyPr/>
+          <a:lstStyle/>
+          <a:p>
+            <a:r>
+              <a:rPr lang="en-US" dirty="0"/>
+              <a:t>The Server (TTP) Window:</a:t>
+            </a:r>
+          </a:p>
+        </p:txBody>
+      </p:sp>
       <p:pic>
         <p:nvPicPr>
           <p:cNvPr id="4" name="Content Placeholder 3"/>
@@ -9458,42 +9422,6 @@
           </a:xfrm>
         </p:spPr>
       </p:pic>
-      <p:sp>
-        <p:nvSpPr>
-          <p:cNvPr id="6" name="Title 1"/>
-          <p:cNvSpPr>
-            <a:spLocks noGrp="1"/>
-          </p:cNvSpPr>
-          <p:nvPr>
-            <p:ph type="title"/>
-          </p:nvPr>
-        </p:nvSpPr>
-        <p:spPr>
-          <a:xfrm>
-            <a:off x="517314" y="594360"/>
-            <a:ext cx="8596668" cy="1320800"/>
-          </a:xfrm>
-        </p:spPr>
-        <p:txBody>
-          <a:bodyPr/>
-          <a:lstStyle/>
-          <a:p>
-            <a:r>
-              <a:rPr lang="en-US" dirty="0" smtClean="0"/>
-              <a:t>The </a:t>
-            </a:r>
-            <a:r>
-              <a:rPr lang="en-US" dirty="0"/>
-              <a:t>S</a:t>
-            </a:r>
-            <a:r>
-              <a:rPr lang="en-US" dirty="0" smtClean="0"/>
-              <a:t>erver (TTP) Window:</a:t>
-            </a:r>
-            <a:endParaRPr lang="en-US" dirty="0"/>
-          </a:p>
-        </p:txBody>
-      </p:sp>
     </p:spTree>
     <p:extLst>
       <p:ext uri="{BB962C8B-B14F-4D97-AF65-F5344CB8AC3E}">
@@ -9504,13 +9432,6 @@
   <p:clrMapOvr>
     <a:masterClrMapping/>
   </p:clrMapOvr>
-  <p:timing>
-    <p:tnLst>
-      <p:par>
-        <p:cTn id="1" dur="indefinite" restart="never" nodeType="tmRoot"/>
-      </p:par>
-    </p:tnLst>
-  </p:timing>
 </p:sld>
 </file>
 
@@ -9547,10 +9468,9 @@
           <a:lstStyle/>
           <a:p>
             <a:r>
-              <a:rPr lang="en-US" dirty="0" smtClean="0"/>
+              <a:rPr lang="en-US" dirty="0"/>
               <a:t>Introduction</a:t>
             </a:r>
-            <a:endParaRPr lang="en-US" dirty="0"/>
           </a:p>
         </p:txBody>
       </p:sp>
@@ -9576,15 +9496,15 @@
               <a:buChar char="•"/>
             </a:pPr>
             <a:r>
-              <a:rPr lang="en-US" sz="3200" dirty="0" smtClean="0"/>
+              <a:rPr lang="en-US" sz="3200" dirty="0"/>
               <a:t>Communication in the 21</a:t>
             </a:r>
             <a:r>
-              <a:rPr lang="en-US" sz="3200" baseline="30000" dirty="0" smtClean="0"/>
+              <a:rPr lang="en-US" sz="3200" baseline="30000" dirty="0"/>
               <a:t>st</a:t>
             </a:r>
             <a:r>
-              <a:rPr lang="en-US" sz="3200" dirty="0" smtClean="0"/>
+              <a:rPr lang="en-US" sz="3200" dirty="0"/>
               <a:t> Century</a:t>
             </a:r>
           </a:p>
@@ -9594,7 +9514,7 @@
               <a:buChar char="•"/>
             </a:pPr>
             <a:r>
-              <a:rPr lang="en-US" sz="3200" dirty="0" smtClean="0"/>
+              <a:rPr lang="en-US" sz="3200" dirty="0"/>
               <a:t>Root of trust problem</a:t>
             </a:r>
           </a:p>
@@ -9604,21 +9524,20 @@
               <a:buChar char="•"/>
             </a:pPr>
             <a:r>
-              <a:rPr lang="en-US" sz="3200" dirty="0" err="1" smtClean="0"/>
+              <a:rPr lang="en-US" sz="3200" dirty="0" err="1"/>
               <a:t>SChat</a:t>
             </a:r>
             <a:r>
-              <a:rPr lang="en-US" sz="3200" dirty="0" smtClean="0"/>
+              <a:rPr lang="en-US" sz="3200" dirty="0"/>
               <a:t> – One chat to rule (secure?) them all…</a:t>
             </a:r>
-            <a:endParaRPr lang="en-US" sz="3200" dirty="0" smtClean="0"/>
           </a:p>
           <a:p>
             <a:pPr>
               <a:buFont typeface="Arial" panose="020B0604020202020204" pitchFamily="34" charset="0"/>
               <a:buChar char="•"/>
             </a:pPr>
-            <a:endParaRPr lang="en-US" sz="3200" dirty="0" smtClean="0"/>
+            <a:endParaRPr lang="en-US" sz="3200" dirty="0"/>
           </a:p>
         </p:txBody>
       </p:sp>
@@ -10024,7 +9943,7 @@
         </p:blipFill>
         <p:spPr>
           <a:xfrm>
-            <a:off x="1158240" y="62026"/>
+            <a:off x="1383526" y="300564"/>
             <a:ext cx="7316846" cy="6094933"/>
           </a:xfrm>
           <a:prstGeom prst="rect">
@@ -10042,13 +9961,6 @@
   <p:clrMapOvr>
     <a:masterClrMapping/>
   </p:clrMapOvr>
-  <p:timing>
-    <p:tnLst>
-      <p:par>
-        <p:cTn id="1" dur="indefinite" restart="never" nodeType="tmRoot"/>
-      </p:par>
-    </p:tnLst>
-  </p:timing>
 </p:sld>
 </file>
 
@@ -10109,13 +10021,6 @@
   <p:clrMapOvr>
     <a:masterClrMapping/>
   </p:clrMapOvr>
-  <p:timing>
-    <p:tnLst>
-      <p:par>
-        <p:cTn id="1" dur="indefinite" restart="never" nodeType="tmRoot"/>
-      </p:par>
-    </p:tnLst>
-  </p:timing>
 </p:sld>
 </file>
 
@@ -10176,13 +10081,6 @@
   <p:clrMapOvr>
     <a:masterClrMapping/>
   </p:clrMapOvr>
-  <p:timing>
-    <p:tnLst>
-      <p:par>
-        <p:cTn id="1" dur="indefinite" restart="never" nodeType="tmRoot"/>
-      </p:par>
-    </p:tnLst>
-  </p:timing>
 </p:sld>
 </file>
 
@@ -10219,22 +10117,17 @@
           <a:lstStyle/>
           <a:p>
             <a:r>
-              <a:rPr lang="en-US" dirty="0" smtClean="0"/>
-              <a:t>Functionality of </a:t>
-            </a:r>
-            <a:r>
-              <a:rPr lang="en-US" dirty="0" smtClean="0"/>
-              <a:t>the </a:t>
-            </a:r>
-            <a:r>
-              <a:rPr lang="en-US" dirty="0" err="1" smtClean="0"/>
+              <a:rPr lang="en-US" dirty="0"/>
+              <a:t>Functionality of the </a:t>
+            </a:r>
+            <a:r>
+              <a:rPr lang="en-US" dirty="0" err="1"/>
               <a:t>SChat</a:t>
             </a:r>
             <a:r>
-              <a:rPr lang="en-US" dirty="0" smtClean="0"/>
+              <a:rPr lang="en-US" dirty="0"/>
               <a:t> protocol</a:t>
             </a:r>
-            <a:endParaRPr lang="en-US" dirty="0"/>
           </a:p>
         </p:txBody>
       </p:sp>
@@ -10256,29 +10149,27 @@
           <a:lstStyle/>
           <a:p>
             <a:r>
-              <a:rPr lang="en-US" sz="3200" dirty="0" smtClean="0"/>
+              <a:rPr lang="en-US" sz="3200" dirty="0"/>
               <a:t>Register your username</a:t>
             </a:r>
-            <a:endParaRPr lang="en-US" sz="3200" dirty="0" smtClean="0"/>
-          </a:p>
-          <a:p>
-            <a:r>
-              <a:rPr lang="en-US" sz="3200" dirty="0" smtClean="0"/>
+          </a:p>
+          <a:p>
+            <a:r>
+              <a:rPr lang="en-US" sz="3200" dirty="0"/>
               <a:t>Go online (connect request)</a:t>
             </a:r>
           </a:p>
           <a:p>
             <a:r>
-              <a:rPr lang="en-US" sz="3200" dirty="0" smtClean="0"/>
+              <a:rPr lang="en-US" sz="3200" dirty="0"/>
               <a:t>Wait for incoming chat request</a:t>
             </a:r>
           </a:p>
           <a:p>
             <a:r>
-              <a:rPr lang="en-US" sz="3200" dirty="0" smtClean="0"/>
+              <a:rPr lang="en-US" sz="3200" dirty="0"/>
               <a:t>Start a chat with a fellow user</a:t>
             </a:r>
-            <a:endParaRPr lang="en-US" sz="3200" dirty="0"/>
           </a:p>
         </p:txBody>
       </p:sp>
@@ -10775,10 +10666,9 @@
           <a:lstStyle/>
           <a:p>
             <a:r>
-              <a:rPr lang="en-US" dirty="0" smtClean="0"/>
+              <a:rPr lang="en-US" dirty="0"/>
               <a:t>Registration Process:</a:t>
             </a:r>
-            <a:endParaRPr lang="en-US" dirty="0"/>
           </a:p>
         </p:txBody>
       </p:sp>
@@ -10840,10 +10730,9 @@
           <a:lstStyle/>
           <a:p>
             <a:r>
-              <a:rPr lang="en-US" dirty="0" smtClean="0"/>
+              <a:rPr lang="en-US" dirty="0"/>
               <a:t>Alice</a:t>
             </a:r>
-            <a:endParaRPr lang="en-US" dirty="0"/>
           </a:p>
         </p:txBody>
       </p:sp>
@@ -10907,10 +10796,9 @@
           <a:lstStyle/>
           <a:p>
             <a:r>
-              <a:rPr lang="en-US" dirty="0" smtClean="0"/>
+              <a:rPr lang="en-US" dirty="0"/>
               <a:t>Server (TTP)</a:t>
             </a:r>
-            <a:endParaRPr lang="en-US" dirty="0"/>
           </a:p>
         </p:txBody>
       </p:sp>
@@ -10973,22 +10861,17 @@
           <a:lstStyle/>
           <a:p>
             <a:r>
-              <a:rPr lang="en-US" dirty="0" smtClean="0"/>
-              <a:t>“Alice”, </a:t>
-            </a:r>
-            <a:r>
-              <a:rPr lang="en-US" dirty="0" smtClean="0"/>
-              <a:t>symmetric key K1, </a:t>
-            </a:r>
-            <a:r>
-              <a:rPr lang="en-US" dirty="0" err="1" smtClean="0"/>
+              <a:rPr lang="en-US" dirty="0"/>
+              <a:t>“Alice”, symmetric key K1, </a:t>
+            </a:r>
+            <a:r>
+              <a:rPr lang="en-US" dirty="0" err="1"/>
               <a:t>nounce</a:t>
             </a:r>
             <a:r>
-              <a:rPr lang="en-US" dirty="0" smtClean="0"/>
+              <a:rPr lang="en-US" dirty="0"/>
               <a:t> </a:t>
             </a:r>
-            <a:endParaRPr lang="en-US" dirty="0"/>
           </a:p>
         </p:txBody>
       </p:sp>
@@ -11015,10 +10898,9 @@
           <a:lstStyle/>
           <a:p>
             <a:r>
-              <a:rPr lang="en-US" dirty="0" smtClean="0"/>
+              <a:rPr lang="en-US" dirty="0"/>
               <a:t>Encrypted with the public key of TTP with RSA</a:t>
             </a:r>
-            <a:endParaRPr lang="en-US" dirty="0"/>
           </a:p>
         </p:txBody>
       </p:sp>
@@ -11084,7 +10966,6 @@
               <a:rPr lang="en-US" dirty="0"/>
               <a:t>Encrypted with Alice’s private key with AES</a:t>
             </a:r>
-            <a:endParaRPr lang="en-US" dirty="0"/>
           </a:p>
         </p:txBody>
       </p:sp>
@@ -11861,7 +11742,7 @@
               <a:buChar char="ü"/>
             </a:pPr>
             <a:r>
-              <a:rPr lang="en-US" sz="2400" dirty="0" smtClean="0"/>
+              <a:rPr lang="en-US" sz="2400" dirty="0"/>
               <a:t>Authenticity</a:t>
             </a:r>
           </a:p>
@@ -11871,10 +11752,9 @@
               <a:buChar char="ü"/>
             </a:pPr>
             <a:r>
-              <a:rPr lang="en-US" sz="2400" dirty="0" smtClean="0"/>
+              <a:rPr lang="en-US" sz="2400" dirty="0"/>
               <a:t>Anonymity </a:t>
             </a:r>
-            <a:endParaRPr lang="en-US" sz="2400" dirty="0" smtClean="0"/>
           </a:p>
           <a:p>
             <a:pPr>
@@ -11882,10 +11762,9 @@
               <a:buChar char="ü"/>
             </a:pPr>
             <a:r>
-              <a:rPr lang="en-US" sz="2400" dirty="0" smtClean="0"/>
+              <a:rPr lang="en-US" sz="2400" dirty="0"/>
               <a:t>Confidentiality </a:t>
             </a:r>
-            <a:endParaRPr lang="en-US" sz="2400" dirty="0" smtClean="0"/>
           </a:p>
           <a:p>
             <a:pPr>
@@ -11893,18 +11772,9 @@
               <a:buChar char="ü"/>
             </a:pPr>
             <a:r>
-              <a:rPr lang="en-US" sz="2400" dirty="0" smtClean="0"/>
-              <a:t>Uses </a:t>
-            </a:r>
-            <a:r>
-              <a:rPr lang="en-US" sz="2400" dirty="0" smtClean="0"/>
-              <a:t>a known secret (the public key of the </a:t>
-            </a:r>
-            <a:r>
-              <a:rPr lang="en-US" sz="2400" dirty="0" smtClean="0"/>
-              <a:t>server)</a:t>
-            </a:r>
-            <a:endParaRPr lang="en-US" sz="2400" dirty="0" smtClean="0"/>
+              <a:rPr lang="en-US" sz="2400" dirty="0"/>
+              <a:t>Uses a known secret (the public key of the server)</a:t>
+            </a:r>
           </a:p>
         </p:txBody>
       </p:sp>
@@ -12347,10 +12217,9 @@
           <a:lstStyle/>
           <a:p>
             <a:r>
-              <a:rPr lang="en-US" dirty="0" smtClean="0"/>
+              <a:rPr lang="en-US" dirty="0"/>
               <a:t>Connection Process:</a:t>
             </a:r>
-            <a:endParaRPr lang="en-US" dirty="0"/>
           </a:p>
         </p:txBody>
       </p:sp>
@@ -12412,10 +12281,9 @@
           <a:lstStyle/>
           <a:p>
             <a:r>
-              <a:rPr lang="en-US" dirty="0" smtClean="0"/>
+              <a:rPr lang="en-US" dirty="0"/>
               <a:t>Alice</a:t>
             </a:r>
-            <a:endParaRPr lang="en-US" dirty="0"/>
           </a:p>
         </p:txBody>
       </p:sp>
@@ -12479,10 +12347,9 @@
           <a:lstStyle/>
           <a:p>
             <a:r>
-              <a:rPr lang="en-US" dirty="0" smtClean="0"/>
+              <a:rPr lang="en-US" dirty="0"/>
               <a:t>Server (TTP)</a:t>
             </a:r>
-            <a:endParaRPr lang="en-US" dirty="0"/>
           </a:p>
         </p:txBody>
       </p:sp>
@@ -12545,26 +12412,9 @@
           <a:lstStyle/>
           <a:p>
             <a:r>
-              <a:rPr lang="en-US" dirty="0" smtClean="0"/>
-              <a:t>“Alice</a:t>
-            </a:r>
-            <a:r>
               <a:rPr lang="en-US" dirty="0"/>
-              <a:t>”, “Alice</a:t>
-            </a:r>
-            <a:r>
-              <a:rPr lang="en-US" dirty="0" smtClean="0"/>
-              <a:t>”, </a:t>
-            </a:r>
-            <a:r>
-              <a:rPr lang="en-US" dirty="0" smtClean="0"/>
-              <a:t>current-time </a:t>
-            </a:r>
-            <a:r>
-              <a:rPr lang="en-US" dirty="0" smtClean="0"/>
-              <a:t>t1</a:t>
-            </a:r>
-            <a:endParaRPr lang="en-US" dirty="0"/>
+              <a:t>“Alice”, “Alice”, current-time t1</a:t>
+            </a:r>
           </a:p>
         </p:txBody>
       </p:sp>
@@ -12591,10 +12441,9 @@
           <a:lstStyle/>
           <a:p>
             <a:r>
-              <a:rPr lang="en-US" dirty="0" smtClean="0"/>
+              <a:rPr lang="en-US" dirty="0"/>
               <a:t>Encrypted with the public key of TTP with RSA</a:t>
             </a:r>
-            <a:endParaRPr lang="en-US" dirty="0"/>
           </a:p>
         </p:txBody>
       </p:sp>
@@ -12656,44 +12505,20 @@
           </a:bodyPr>
           <a:lstStyle/>
           <a:p>
-            <a:endParaRPr lang="en-US" dirty="0" smtClean="0">
+            <a:endParaRPr lang="en-US" dirty="0">
               <a:solidFill>
                 <a:srgbClr val="0070C0"/>
               </a:solidFill>
             </a:endParaRPr>
           </a:p>
           <a:p>
-            <a:r>
-              <a:rPr lang="en-US" dirty="0" smtClean="0">
-                <a:solidFill>
-                  <a:srgbClr val="0070C0"/>
-                </a:solidFill>
-              </a:rPr>
-              <a:t>Encrypted </a:t>
-            </a:r>
             <a:r>
               <a:rPr lang="en-US" dirty="0">
                 <a:solidFill>
                   <a:srgbClr val="0070C0"/>
                 </a:solidFill>
               </a:rPr>
-              <a:t>with K1 </a:t>
-            </a:r>
-            <a:r>
-              <a:rPr lang="en-US" dirty="0" smtClean="0">
-                <a:solidFill>
-                  <a:srgbClr val="0070C0"/>
-                </a:solidFill>
-              </a:rPr>
-              <a:t>with </a:t>
-            </a:r>
-            <a:r>
-              <a:rPr lang="en-US" dirty="0">
-                <a:solidFill>
-                  <a:srgbClr val="0070C0"/>
-                </a:solidFill>
-              </a:rPr>
-              <a:t>AES</a:t>
+              <a:t>Encrypted with K1 with AES</a:t>
             </a:r>
           </a:p>
           <a:p>
@@ -12935,23 +12760,7 @@
                   <a:schemeClr val="tx1"/>
                 </a:solidFill>
               </a:rPr>
-              <a:t> </a:t>
-            </a:r>
-            <a:r>
-              <a:rPr lang="en-US" dirty="0" smtClean="0">
-                <a:solidFill>
-                  <a:schemeClr val="tx1"/>
-                </a:solidFill>
-              </a:rPr>
-              <a:t>token-time </a:t>
-            </a:r>
-            <a:r>
-              <a:rPr lang="en-US" dirty="0">
-                <a:solidFill>
-                  <a:schemeClr val="tx1"/>
-                </a:solidFill>
-              </a:rPr>
-              <a:t>t1  </a:t>
+              <a:t> token-time t1  </a:t>
             </a:r>
           </a:p>
         </p:txBody>
@@ -13806,12 +13615,8 @@
           <a:lstStyle/>
           <a:p>
             <a:r>
-              <a:rPr lang="en-US" dirty="0" smtClean="0"/>
-              <a:t>Connection </a:t>
-            </a:r>
-            <a:r>
               <a:rPr lang="en-US" dirty="0"/>
-              <a:t>Process:</a:t>
+              <a:t>Connection Process:</a:t>
             </a:r>
           </a:p>
         </p:txBody>
@@ -13838,7 +13643,7 @@
               <a:buChar char="ü"/>
             </a:pPr>
             <a:r>
-              <a:rPr lang="en-US" sz="2400" dirty="0" smtClean="0"/>
+              <a:rPr lang="en-US" sz="2400" dirty="0"/>
               <a:t>Authenticity</a:t>
             </a:r>
           </a:p>
@@ -13848,7 +13653,7 @@
               <a:buChar char="ü"/>
             </a:pPr>
             <a:r>
-              <a:rPr lang="en-US" sz="2400" dirty="0" smtClean="0"/>
+              <a:rPr lang="en-US" sz="2400" dirty="0"/>
               <a:t>Anonymity </a:t>
             </a:r>
           </a:p>
@@ -13858,14 +13663,13 @@
               <a:buChar char="ü"/>
             </a:pPr>
             <a:r>
-              <a:rPr lang="en-US" sz="2400" dirty="0" smtClean="0"/>
+              <a:rPr lang="en-US" sz="2400" dirty="0"/>
               <a:t>Time limit</a:t>
             </a:r>
             <a:r>
-              <a:rPr lang="en-US" sz="2200" dirty="0" smtClean="0"/>
+              <a:rPr lang="en-US" sz="2200" dirty="0"/>
               <a:t> </a:t>
             </a:r>
-            <a:endParaRPr lang="en-US" sz="2200" dirty="0" smtClean="0"/>
           </a:p>
         </p:txBody>
       </p:sp>
@@ -14226,10 +14030,9 @@
           <a:p>
             <a:pPr algn="ctr"/>
             <a:r>
-              <a:rPr lang="en-US" sz="5400" dirty="0" smtClean="0"/>
+              <a:rPr lang="en-US" sz="5400" dirty="0"/>
               <a:t>Opening Chat Process</a:t>
             </a:r>
-            <a:endParaRPr lang="en-US" sz="5400" dirty="0"/>
           </a:p>
         </p:txBody>
       </p:sp>
@@ -14256,16 +14059,8 @@
           <a:lstStyle/>
           <a:p>
             <a:r>
-              <a:rPr lang="en-US" sz="2800" dirty="0" smtClean="0"/>
-              <a:t>The chat </a:t>
-            </a:r>
-            <a:r>
-              <a:rPr lang="en-US" sz="2800" dirty="0" smtClean="0"/>
-              <a:t>opening process </a:t>
-            </a:r>
-            <a:r>
-              <a:rPr lang="en-US" sz="2800" dirty="0" smtClean="0"/>
-              <a:t>is in two steps:</a:t>
+              <a:rPr lang="en-US" sz="2800" dirty="0"/>
+              <a:t>The chat opening process is in two steps:</a:t>
             </a:r>
           </a:p>
           <a:p>
@@ -14274,14 +14069,9 @@
               <a:buChar char="q"/>
             </a:pPr>
             <a:r>
-              <a:rPr lang="en-US" sz="2800" dirty="0" smtClean="0"/>
-              <a:t>Step 1: Alice – </a:t>
-            </a:r>
-            <a:r>
-              <a:rPr lang="en-US" sz="2800" dirty="0" smtClean="0"/>
-              <a:t>TTP – Get Info</a:t>
-            </a:r>
-            <a:endParaRPr lang="en-US" sz="2800" dirty="0" smtClean="0"/>
+              <a:rPr lang="en-US" sz="2800" dirty="0"/>
+              <a:t>Step 1: Alice – TTP – Get Info</a:t>
+            </a:r>
           </a:p>
           <a:p>
             <a:pPr lvl="1">
@@ -14289,14 +14079,9 @@
               <a:buChar char="q"/>
             </a:pPr>
             <a:r>
-              <a:rPr lang="en-US" sz="2800" dirty="0" smtClean="0"/>
-              <a:t>Step 2: Alice </a:t>
-            </a:r>
-            <a:r>
-              <a:rPr lang="en-US" sz="2800" dirty="0" smtClean="0"/>
-              <a:t>– Bob – Handshake</a:t>
-            </a:r>
-            <a:endParaRPr lang="en-US" sz="2800" dirty="0" smtClean="0"/>
+              <a:rPr lang="en-US" sz="2800" dirty="0"/>
+              <a:t>Step 2: Alice – Bob – Handshake</a:t>
+            </a:r>
           </a:p>
         </p:txBody>
       </p:sp>
@@ -14590,29 +14375,16 @@
           <a:p>
             <a:pPr algn="ctr"/>
             <a:r>
-              <a:rPr lang="en-US" dirty="0" smtClean="0"/>
-              <a:t>Open </a:t>
-            </a:r>
-            <a:r>
-              <a:rPr lang="en-US" dirty="0" smtClean="0"/>
-              <a:t>Chat - </a:t>
-            </a:r>
-            <a:r>
-              <a:rPr lang="en-US" dirty="0" smtClean="0"/>
-              <a:t>Step </a:t>
-            </a:r>
-            <a:r>
-              <a:rPr lang="en-US" dirty="0" smtClean="0"/>
-              <a:t>1</a:t>
+              <a:rPr lang="en-US" dirty="0"/>
+              <a:t>Open Chat - Step 1</a:t>
             </a:r>
             <a:br>
-              <a:rPr lang="en-US" dirty="0" smtClean="0"/>
+              <a:rPr lang="en-US" dirty="0"/>
             </a:br>
             <a:r>
-              <a:rPr lang="en-US" dirty="0" smtClean="0"/>
+              <a:rPr lang="en-US" dirty="0"/>
               <a:t>Get Info</a:t>
             </a:r>
-            <a:endParaRPr lang="en-US" dirty="0"/>
           </a:p>
         </p:txBody>
       </p:sp>
@@ -14674,10 +14446,9 @@
           <a:lstStyle/>
           <a:p>
             <a:r>
-              <a:rPr lang="en-US" dirty="0" smtClean="0"/>
+              <a:rPr lang="en-US" dirty="0"/>
               <a:t>Alice</a:t>
             </a:r>
-            <a:endParaRPr lang="en-US" dirty="0"/>
           </a:p>
         </p:txBody>
       </p:sp>
@@ -14741,10 +14512,9 @@
           <a:lstStyle/>
           <a:p>
             <a:r>
-              <a:rPr lang="en-US" dirty="0" smtClean="0"/>
+              <a:rPr lang="en-US" dirty="0"/>
               <a:t>Server (TTP)</a:t>
             </a:r>
-            <a:endParaRPr lang="en-US" dirty="0"/>
           </a:p>
         </p:txBody>
       </p:sp>
@@ -14807,10 +14577,9 @@
           <a:lstStyle/>
           <a:p>
             <a:r>
-              <a:rPr lang="en-US" dirty="0" smtClean="0"/>
+              <a:rPr lang="en-US" dirty="0"/>
               <a:t>Encrypted with the public key of TTP with RSA</a:t>
             </a:r>
-            <a:endParaRPr lang="en-US" dirty="0"/>
           </a:p>
         </p:txBody>
       </p:sp>
@@ -14873,18 +14642,13 @@
           <a:lstStyle/>
           <a:p>
             <a:r>
-              <a:rPr lang="en-US" dirty="0" smtClean="0">
+              <a:rPr lang="en-US" dirty="0">
                 <a:solidFill>
                   <a:srgbClr val="C00000"/>
                 </a:solidFill>
               </a:rPr>
               <a:t>Encrypted with Bob’s private key with AES</a:t>
             </a:r>
-            <a:endParaRPr lang="en-US" dirty="0">
-              <a:solidFill>
-                <a:srgbClr val="C00000"/>
-              </a:solidFill>
-            </a:endParaRPr>
           </a:p>
         </p:txBody>
       </p:sp>
@@ -14990,18 +14754,13 @@
           <a:lstStyle/>
           <a:p>
             <a:r>
-              <a:rPr lang="en-US" dirty="0" smtClean="0">
+              <a:rPr lang="en-US" dirty="0">
                 <a:solidFill>
                   <a:srgbClr val="C00000"/>
                 </a:solidFill>
               </a:rPr>
               <a:t>This will be used in the next step – called “token”</a:t>
             </a:r>
-            <a:endParaRPr lang="en-US" dirty="0">
-              <a:solidFill>
-                <a:srgbClr val="C00000"/>
-              </a:solidFill>
-            </a:endParaRPr>
           </a:p>
         </p:txBody>
       </p:sp>
@@ -15125,23 +14884,15 @@
           <a:p>
             <a:pPr algn="ctr"/>
             <a:r>
-              <a:rPr lang="en-US" dirty="0" smtClean="0">
-                <a:solidFill>
-                  <a:schemeClr val="tx1"/>
-                </a:solidFill>
-              </a:rPr>
-              <a:t>“</a:t>
-            </a:r>
-            <a:r>
               <a:rPr lang="en-US" dirty="0">
                 <a:solidFill>
                   <a:schemeClr val="tx1"/>
                 </a:solidFill>
               </a:rPr>
-              <a:t>Alice”, Shared-key </a:t>
-            </a:r>
-            <a:r>
-              <a:rPr lang="en-US" dirty="0" err="1" smtClean="0">
+              <a:t>“Alice”, Shared-key </a:t>
+            </a:r>
+            <a:r>
+              <a:rPr lang="en-US" dirty="0" err="1">
                 <a:solidFill>
                   <a:schemeClr val="tx1"/>
                 </a:solidFill>
@@ -15241,7 +14992,7 @@
           </a:p>
           <a:p>
             <a:pPr algn="ctr"/>
-            <a:endParaRPr lang="en-US" dirty="0" smtClean="0"/>
+            <a:endParaRPr lang="en-US" dirty="0"/>
           </a:p>
           <a:p>
             <a:pPr algn="ctr"/>
@@ -15321,7 +15072,7 @@
           </a:bodyPr>
           <a:lstStyle/>
           <a:p>
-            <a:endParaRPr lang="en-US" dirty="0" smtClean="0">
+            <a:endParaRPr lang="en-US" dirty="0">
               <a:solidFill>
                 <a:srgbClr val="0070C0"/>
               </a:solidFill>

</xml_diff>